<commit_message>
deleted some unnecessary stuff + added presentation stuff
</commit_message>
<xml_diff>
--- a/Praesentation/Praesi.pptx
+++ b/Praesentation/Praesi.pptx
@@ -5,10 +5,10 @@
     <p:sldMasterId id="2147483648" r:id="rId1"/>
   </p:sldMasterIdLst>
   <p:notesMasterIdLst>
-    <p:notesMasterId r:id="rId36"/>
+    <p:notesMasterId r:id="rId50"/>
   </p:notesMasterIdLst>
   <p:handoutMasterIdLst>
-    <p:handoutMasterId r:id="rId37"/>
+    <p:handoutMasterId r:id="rId51"/>
   </p:handoutMasterIdLst>
   <p:sldIdLst>
     <p:sldId id="258" r:id="rId2"/>
@@ -32,19 +32,33 @@
     <p:sldId id="267" r:id="rId20"/>
     <p:sldId id="287" r:id="rId21"/>
     <p:sldId id="288" r:id="rId22"/>
-    <p:sldId id="289" r:id="rId23"/>
-    <p:sldId id="290" r:id="rId24"/>
-    <p:sldId id="291" r:id="rId25"/>
-    <p:sldId id="292" r:id="rId26"/>
-    <p:sldId id="294" r:id="rId27"/>
-    <p:sldId id="293" r:id="rId28"/>
-    <p:sldId id="295" r:id="rId29"/>
-    <p:sldId id="296" r:id="rId30"/>
-    <p:sldId id="297" r:id="rId31"/>
-    <p:sldId id="298" r:id="rId32"/>
-    <p:sldId id="300" r:id="rId33"/>
-    <p:sldId id="301" r:id="rId34"/>
-    <p:sldId id="260" r:id="rId35"/>
+    <p:sldId id="302" r:id="rId23"/>
+    <p:sldId id="303" r:id="rId24"/>
+    <p:sldId id="304" r:id="rId25"/>
+    <p:sldId id="305" r:id="rId26"/>
+    <p:sldId id="306" r:id="rId27"/>
+    <p:sldId id="308" r:id="rId28"/>
+    <p:sldId id="309" r:id="rId29"/>
+    <p:sldId id="338" r:id="rId30"/>
+    <p:sldId id="339" r:id="rId31"/>
+    <p:sldId id="319" r:id="rId32"/>
+    <p:sldId id="320" r:id="rId33"/>
+    <p:sldId id="321" r:id="rId34"/>
+    <p:sldId id="322" r:id="rId35"/>
+    <p:sldId id="323" r:id="rId36"/>
+    <p:sldId id="324" r:id="rId37"/>
+    <p:sldId id="325" r:id="rId38"/>
+    <p:sldId id="327" r:id="rId39"/>
+    <p:sldId id="328" r:id="rId40"/>
+    <p:sldId id="329" r:id="rId41"/>
+    <p:sldId id="333" r:id="rId42"/>
+    <p:sldId id="331" r:id="rId43"/>
+    <p:sldId id="332" r:id="rId44"/>
+    <p:sldId id="334" r:id="rId45"/>
+    <p:sldId id="336" r:id="rId46"/>
+    <p:sldId id="335" r:id="rId47"/>
+    <p:sldId id="337" r:id="rId48"/>
+    <p:sldId id="260" r:id="rId49"/>
   </p:sldIdLst>
   <p:sldSz cx="9144000" cy="6858000" type="screen4x3"/>
   <p:notesSz cx="6858000" cy="9144000"/>
@@ -290,7 +304,7 @@
               <a:pPr>
                 <a:defRPr/>
               </a:pPr>
-              <a:t>17.08.2017</a:t>
+              <a:t>25.08.2017</a:t>
             </a:fld>
             <a:endParaRPr lang="de-DE"/>
           </a:p>
@@ -471,7 +485,7 @@
               <a:pPr>
                 <a:defRPr/>
               </a:pPr>
-              <a:t>17.08.2017</a:t>
+              <a:t>25.08.2017</a:t>
             </a:fld>
             <a:endParaRPr lang="de-DE"/>
           </a:p>
@@ -1462,7 +1476,7 @@
               <a:pPr>
                 <a:defRPr/>
               </a:pPr>
-              <a:t>17.08.2017</a:t>
+              <a:t>25.08.2017</a:t>
             </a:fld>
             <a:endParaRPr lang="de-DE" dirty="0"/>
           </a:p>
@@ -2282,7 +2296,7 @@
               <a:pPr>
                 <a:defRPr/>
               </a:pPr>
-              <a:t>17.08.2017</a:t>
+              <a:t>25.08.2017</a:t>
             </a:fld>
             <a:endParaRPr lang="de-DE" dirty="0"/>
           </a:p>
@@ -2636,7 +2650,7 @@
               <a:pPr>
                 <a:defRPr/>
               </a:pPr>
-              <a:t>17.08.2017</a:t>
+              <a:t>25.08.2017</a:t>
             </a:fld>
             <a:endParaRPr lang="de-DE" dirty="0"/>
           </a:p>
@@ -2979,7 +2993,7 @@
               <a:pPr>
                 <a:defRPr/>
               </a:pPr>
-              <a:t>17.08.2017</a:t>
+              <a:t>25.08.2017</a:t>
             </a:fld>
             <a:endParaRPr lang="de-DE" dirty="0"/>
           </a:p>
@@ -3307,7 +3321,7 @@
               <a:pPr>
                 <a:defRPr/>
               </a:pPr>
-              <a:t>17.08.2017</a:t>
+              <a:t>25.08.2017</a:t>
             </a:fld>
             <a:endParaRPr lang="de-DE" dirty="0"/>
           </a:p>
@@ -3635,7 +3649,7 @@
               <a:pPr>
                 <a:defRPr/>
               </a:pPr>
-              <a:t>17.08.2017</a:t>
+              <a:t>25.08.2017</a:t>
             </a:fld>
             <a:endParaRPr lang="de-DE" dirty="0"/>
           </a:p>
@@ -4043,7 +4057,7 @@
               <a:pPr>
                 <a:defRPr/>
               </a:pPr>
-              <a:t>17.08.2017</a:t>
+              <a:t>25.08.2017</a:t>
             </a:fld>
             <a:endParaRPr lang="de-DE" dirty="0"/>
           </a:p>
@@ -4411,7 +4425,7 @@
               <a:pPr>
                 <a:defRPr/>
               </a:pPr>
-              <a:t>17.08.2017</a:t>
+              <a:t>25.08.2017</a:t>
             </a:fld>
             <a:endParaRPr lang="de-DE" dirty="0"/>
           </a:p>
@@ -4674,7 +4688,7 @@
               <a:pPr>
                 <a:defRPr/>
               </a:pPr>
-              <a:t>17.08.2017</a:t>
+              <a:t>25.08.2017</a:t>
             </a:fld>
             <a:endParaRPr lang="de-DE" dirty="0"/>
           </a:p>
@@ -6052,11 +6066,7 @@
             </a:pPr>
             <a:r>
               <a:rPr lang="de-DE" dirty="0" smtClean="0"/>
-              <a:t> Problem</a:t>
-            </a:r>
-            <a:r>
-              <a:rPr lang="de-DE" dirty="0" smtClean="0"/>
-              <a:t>: Wichtigkeit des Terms?</a:t>
+              <a:t> Problem: Wichtigkeit des Terms?</a:t>
             </a:r>
           </a:p>
           <a:p>
@@ -6798,11 +6808,7 @@
             </a:pPr>
             <a:r>
               <a:rPr lang="de-DE" dirty="0" smtClean="0"/>
-              <a:t> Ähnlichkeitsfunktion</a:t>
-            </a:r>
-            <a:r>
-              <a:rPr lang="de-DE" dirty="0" smtClean="0"/>
-              <a:t>: Cosinus-Maß</a:t>
+              <a:t> Ähnlichkeitsfunktion: Cosinus-Maß</a:t>
             </a:r>
           </a:p>
         </p:txBody>
@@ -6830,7 +6836,7 @@
               <a:pPr>
                 <a:defRPr/>
               </a:pPr>
-              <a:t>17.08.2017</a:t>
+              <a:t>25.08.2017</a:t>
             </a:fld>
             <a:endParaRPr lang="de-DE" dirty="0"/>
           </a:p>
@@ -7173,7 +7179,7 @@
               <a:pPr>
                 <a:defRPr/>
               </a:pPr>
-              <a:t>17.08.2017</a:t>
+              <a:t>25.08.2017</a:t>
             </a:fld>
             <a:endParaRPr lang="de-DE" dirty="0"/>
           </a:p>
@@ -7336,7 +7342,7 @@
               <a:pPr>
                 <a:defRPr/>
               </a:pPr>
-              <a:t>17.08.2017</a:t>
+              <a:t>25.08.2017</a:t>
             </a:fld>
             <a:endParaRPr lang="de-DE" dirty="0"/>
           </a:p>
@@ -7523,11 +7529,7 @@
             </a:pPr>
             <a:r>
               <a:rPr lang="de-DE" dirty="0" smtClean="0"/>
-              <a:t> Längenunabhängige </a:t>
-            </a:r>
-            <a:r>
-              <a:rPr lang="de-DE" dirty="0" smtClean="0"/>
-              <a:t>Ähnlichkeitsfunktion</a:t>
+              <a:t> Längenunabhängige Ähnlichkeitsfunktion</a:t>
             </a:r>
           </a:p>
           <a:p>
@@ -7539,7 +7541,6 @@
               <a:rPr lang="de-DE" dirty="0" smtClean="0"/>
               <a:t> Cosinus-Maß</a:t>
             </a:r>
-            <a:endParaRPr lang="de-DE" dirty="0" smtClean="0"/>
           </a:p>
           <a:p>
             <a:endParaRPr lang="de-DE" dirty="0" smtClean="0"/>
@@ -7746,11 +7747,7 @@
             </a:pPr>
             <a:r>
               <a:rPr lang="de-DE" dirty="0" smtClean="0"/>
-              <a:t> Verarbeitung </a:t>
-            </a:r>
-            <a:r>
-              <a:rPr lang="de-DE" dirty="0" smtClean="0"/>
-              <a:t>unstrukturierter Dokumente</a:t>
+              <a:t> Verarbeitung unstrukturierter Dokumente</a:t>
             </a:r>
           </a:p>
           <a:p>
@@ -7760,11 +7757,7 @@
             </a:pPr>
             <a:r>
               <a:rPr lang="de-DE" dirty="0" smtClean="0"/>
-              <a:t> Beispiele</a:t>
-            </a:r>
-            <a:r>
-              <a:rPr lang="de-DE" dirty="0" smtClean="0"/>
-              <a:t>:</a:t>
+              <a:t> Beispiele:</a:t>
             </a:r>
           </a:p>
           <a:p>
@@ -8025,15 +8018,7 @@
             </a:pPr>
             <a:r>
               <a:rPr lang="de-DE" dirty="0" smtClean="0"/>
-              <a:t> AND: </a:t>
-            </a:r>
-            <a:r>
-              <a:rPr lang="de-DE" dirty="0" smtClean="0"/>
-              <a:t>Durchschnitt </a:t>
-            </a:r>
-            <a:r>
-              <a:rPr lang="de-DE" dirty="0" smtClean="0"/>
-              <a:t>der </a:t>
+              <a:t> AND: Durchschnitt der </a:t>
             </a:r>
             <a:r>
               <a:rPr lang="de-DE" dirty="0" err="1" smtClean="0"/>
@@ -8048,15 +8033,7 @@
             </a:pPr>
             <a:r>
               <a:rPr lang="de-DE" dirty="0" smtClean="0"/>
-              <a:t> </a:t>
-            </a:r>
-            <a:r>
-              <a:rPr lang="de-DE" dirty="0" smtClean="0"/>
-              <a:t>OR: Vereinigung </a:t>
-            </a:r>
-            <a:r>
-              <a:rPr lang="de-DE" dirty="0" smtClean="0"/>
-              <a:t>der </a:t>
+              <a:t> OR: Vereinigung der </a:t>
             </a:r>
             <a:r>
               <a:rPr lang="de-DE" dirty="0" err="1" smtClean="0"/>
@@ -8099,7 +8076,7 @@
               <a:pPr>
                 <a:defRPr/>
               </a:pPr>
-              <a:t>17.08.2017</a:t>
+              <a:t>25.08.2017</a:t>
             </a:fld>
             <a:endParaRPr lang="de-DE" dirty="0"/>
           </a:p>
@@ -8281,15 +8258,7 @@
             </a:pPr>
             <a:r>
               <a:rPr lang="de-DE" dirty="0" smtClean="0"/>
-              <a:t> OR: </a:t>
-            </a:r>
-            <a:r>
-              <a:rPr lang="de-DE" dirty="0" smtClean="0"/>
-              <a:t>Vereinigung </a:t>
-            </a:r>
-            <a:r>
-              <a:rPr lang="de-DE" dirty="0" smtClean="0"/>
-              <a:t>der </a:t>
+              <a:t> OR: Vereinigung der </a:t>
             </a:r>
             <a:r>
               <a:rPr lang="de-DE" dirty="0" err="1" smtClean="0"/>
@@ -8361,7 +8330,7 @@
               <a:pPr>
                 <a:defRPr/>
               </a:pPr>
-              <a:t>17.08.2017</a:t>
+              <a:t>25.08.2017</a:t>
             </a:fld>
             <a:endParaRPr lang="de-DE" dirty="0"/>
           </a:p>
@@ -8496,7 +8465,7 @@
               <a:pPr>
                 <a:defRPr/>
               </a:pPr>
-              <a:t>17.08.2017</a:t>
+              <a:t>25.08.2017</a:t>
             </a:fld>
             <a:endParaRPr lang="de-DE" dirty="0"/>
           </a:p>
@@ -8578,7 +8547,7 @@
       </p:sp>
       <p:pic>
         <p:nvPicPr>
-          <p:cNvPr id="36866" name="Picture 2" descr="C:\Users\kreme\Documents\SuchTool\Praesentation\1.png"/>
+          <p:cNvPr id="37890" name="Picture 2" descr="C:\Users\kreme\Documents\SuchTool\Bilder\Overview.png"/>
           <p:cNvPicPr>
             <a:picLocks noGrp="1" noChangeAspect="1" noChangeArrowheads="1"/>
           </p:cNvPicPr>
@@ -8595,8 +8564,8 @@
         </p:blipFill>
         <p:spPr bwMode="auto">
           <a:xfrm>
-            <a:off x="1198388" y="1268413"/>
-            <a:ext cx="6745637" cy="5040312"/>
+            <a:off x="179512" y="1080000"/>
+            <a:ext cx="6759128" cy="5040312"/>
           </a:xfrm>
           <a:prstGeom prst="rect">
             <a:avLst/>
@@ -8652,7 +8621,7 @@
               <a:pPr>
                 <a:defRPr/>
               </a:pPr>
-              <a:t>17.08.2017</a:t>
+              <a:t>25.08.2017</a:t>
             </a:fld>
             <a:endParaRPr lang="de-DE" dirty="0"/>
           </a:p>
@@ -8676,7 +8645,7 @@
             <a:pPr>
               <a:defRPr/>
             </a:pPr>
-            <a:endParaRPr lang="de-DE"/>
+            <a:endParaRPr lang="de-DE" dirty="0"/>
           </a:p>
         </p:txBody>
       </p:sp>
@@ -8734,7 +8703,7 @@
       </p:sp>
       <p:pic>
         <p:nvPicPr>
-          <p:cNvPr id="37891" name="Picture 3" descr="C:\Users\kreme\Documents\SuchTool\Praesentation\2.png"/>
+          <p:cNvPr id="38915" name="Picture 3" descr="C:\Users\kreme\Documents\SuchTool\Bilder\a.png"/>
           <p:cNvPicPr>
             <a:picLocks noGrp="1" noChangeAspect="1" noChangeArrowheads="1"/>
           </p:cNvPicPr>
@@ -8751,8 +8720,8 @@
         </p:blipFill>
         <p:spPr bwMode="auto">
           <a:xfrm>
-            <a:off x="1198388" y="1268413"/>
-            <a:ext cx="6745637" cy="5040312"/>
+            <a:off x="180000" y="1080000"/>
+            <a:ext cx="6759128" cy="5040312"/>
           </a:xfrm>
           <a:prstGeom prst="rect">
             <a:avLst/>
@@ -8760,6 +8729,36 @@
           <a:noFill/>
         </p:spPr>
       </p:pic>
+      <p:sp>
+        <p:nvSpPr>
+          <p:cNvPr id="9" name="Textfeld 8"/>
+          <p:cNvSpPr txBox="1"/>
+          <p:nvPr/>
+        </p:nvSpPr>
+        <p:spPr>
+          <a:xfrm>
+            <a:off x="7020272" y="1340768"/>
+            <a:ext cx="2212209" cy="400110"/>
+          </a:xfrm>
+          <a:prstGeom prst="rect">
+            <a:avLst/>
+          </a:prstGeom>
+          <a:noFill/>
+        </p:spPr>
+        <p:txBody>
+          <a:bodyPr wrap="none" rtlCol="0">
+            <a:spAutoFit/>
+          </a:bodyPr>
+          <a:lstStyle/>
+          <a:p>
+            <a:r>
+              <a:rPr lang="de-DE" sz="2000" dirty="0" smtClean="0"/>
+              <a:t>Verzeichnisauswahl</a:t>
+            </a:r>
+            <a:endParaRPr lang="de-DE" sz="2000" dirty="0"/>
+          </a:p>
+        </p:txBody>
+      </p:sp>
     </p:spTree>
   </p:cSld>
   <p:clrMapOvr>
@@ -8808,7 +8807,7 @@
               <a:pPr>
                 <a:defRPr/>
               </a:pPr>
-              <a:t>17.08.2017</a:t>
+              <a:t>25.08.2017</a:t>
             </a:fld>
             <a:endParaRPr lang="de-DE" dirty="0"/>
           </a:p>
@@ -8890,7 +8889,7 @@
       </p:sp>
       <p:pic>
         <p:nvPicPr>
-          <p:cNvPr id="38914" name="Picture 2" descr="C:\Users\kreme\Documents\SuchTool\Praesentation\3.png"/>
+          <p:cNvPr id="39938" name="Picture 2" descr="C:\Users\kreme\Documents\SuchTool\Bilder\b.png"/>
           <p:cNvPicPr>
             <a:picLocks noGrp="1" noChangeAspect="1" noChangeArrowheads="1"/>
           </p:cNvPicPr>
@@ -8907,8 +8906,8 @@
         </p:blipFill>
         <p:spPr bwMode="auto">
           <a:xfrm>
-            <a:off x="1198388" y="1268413"/>
-            <a:ext cx="6745637" cy="5040312"/>
+            <a:off x="180000" y="1080000"/>
+            <a:ext cx="6759128" cy="5040312"/>
           </a:xfrm>
           <a:prstGeom prst="rect">
             <a:avLst/>
@@ -8916,6 +8915,36 @@
           <a:noFill/>
         </p:spPr>
       </p:pic>
+      <p:sp>
+        <p:nvSpPr>
+          <p:cNvPr id="9" name="Textfeld 8"/>
+          <p:cNvSpPr txBox="1"/>
+          <p:nvPr/>
+        </p:nvSpPr>
+        <p:spPr>
+          <a:xfrm>
+            <a:off x="7092280" y="2204864"/>
+            <a:ext cx="2160240" cy="400110"/>
+          </a:xfrm>
+          <a:prstGeom prst="rect">
+            <a:avLst/>
+          </a:prstGeom>
+          <a:noFill/>
+        </p:spPr>
+        <p:txBody>
+          <a:bodyPr wrap="square" rtlCol="0">
+            <a:spAutoFit/>
+          </a:bodyPr>
+          <a:lstStyle/>
+          <a:p>
+            <a:r>
+              <a:rPr lang="de-DE" sz="2000" dirty="0" smtClean="0"/>
+              <a:t>Gesamtanfrage</a:t>
+            </a:r>
+            <a:endParaRPr lang="de-DE" sz="2000" dirty="0"/>
+          </a:p>
+        </p:txBody>
+      </p:sp>
     </p:spTree>
   </p:cSld>
   <p:clrMapOvr>
@@ -8964,7 +8993,7 @@
               <a:pPr>
                 <a:defRPr/>
               </a:pPr>
-              <a:t>17.08.2017</a:t>
+              <a:t>25.08.2017</a:t>
             </a:fld>
             <a:endParaRPr lang="de-DE" dirty="0"/>
           </a:p>
@@ -9046,7 +9075,7 @@
       </p:sp>
       <p:pic>
         <p:nvPicPr>
-          <p:cNvPr id="39938" name="Picture 2" descr="C:\Users\kreme\Documents\SuchTool\Praesentation\frei.png"/>
+          <p:cNvPr id="40962" name="Picture 2" descr="C:\Users\kreme\Documents\SuchTool\Bilder\c.png"/>
           <p:cNvPicPr>
             <a:picLocks noGrp="1" noChangeAspect="1" noChangeArrowheads="1"/>
           </p:cNvPicPr>
@@ -9063,8 +9092,8 @@
         </p:blipFill>
         <p:spPr bwMode="auto">
           <a:xfrm>
-            <a:off x="1198388" y="1268413"/>
-            <a:ext cx="6745637" cy="5040312"/>
+            <a:off x="180000" y="1080000"/>
+            <a:ext cx="6759128" cy="5040312"/>
           </a:xfrm>
           <a:prstGeom prst="rect">
             <a:avLst/>
@@ -9072,6 +9101,36 @@
           <a:noFill/>
         </p:spPr>
       </p:pic>
+      <p:sp>
+        <p:nvSpPr>
+          <p:cNvPr id="8" name="Textfeld 7"/>
+          <p:cNvSpPr txBox="1"/>
+          <p:nvPr/>
+        </p:nvSpPr>
+        <p:spPr>
+          <a:xfrm>
+            <a:off x="7092280" y="4437112"/>
+            <a:ext cx="1512168" cy="400110"/>
+          </a:xfrm>
+          <a:prstGeom prst="rect">
+            <a:avLst/>
+          </a:prstGeom>
+          <a:noFill/>
+        </p:spPr>
+        <p:txBody>
+          <a:bodyPr wrap="square" rtlCol="0">
+            <a:spAutoFit/>
+          </a:bodyPr>
+          <a:lstStyle/>
+          <a:p>
+            <a:r>
+              <a:rPr lang="de-DE" sz="2000" dirty="0" smtClean="0"/>
+              <a:t>Teilanfrage</a:t>
+            </a:r>
+            <a:endParaRPr lang="de-DE" sz="2000" dirty="0"/>
+          </a:p>
+        </p:txBody>
+      </p:sp>
     </p:spTree>
   </p:cSld>
   <p:clrMapOvr>
@@ -9120,7 +9179,7 @@
               <a:pPr>
                 <a:defRPr/>
               </a:pPr>
-              <a:t>17.08.2017</a:t>
+              <a:t>25.08.2017</a:t>
             </a:fld>
             <a:endParaRPr lang="de-DE" dirty="0"/>
           </a:p>
@@ -9202,7 +9261,7 @@
       </p:sp>
       <p:pic>
         <p:nvPicPr>
-          <p:cNvPr id="40962" name="Picture 2" descr="C:\Users\kreme\Documents\SuchTool\Praesentation\meta.png"/>
+          <p:cNvPr id="41986" name="Picture 2" descr="C:\Users\kreme\Documents\SuchTool\Bilder\d.png"/>
           <p:cNvPicPr>
             <a:picLocks noGrp="1" noChangeAspect="1" noChangeArrowheads="1"/>
           </p:cNvPicPr>
@@ -9219,8 +9278,8 @@
         </p:blipFill>
         <p:spPr bwMode="auto">
           <a:xfrm>
-            <a:off x="1198388" y="1268413"/>
-            <a:ext cx="6745637" cy="5040312"/>
+            <a:off x="180000" y="1080000"/>
+            <a:ext cx="6759128" cy="5040312"/>
           </a:xfrm>
           <a:prstGeom prst="rect">
             <a:avLst/>
@@ -9228,6 +9287,41 @@
           <a:noFill/>
         </p:spPr>
       </p:pic>
+      <p:sp>
+        <p:nvSpPr>
+          <p:cNvPr id="8" name="Textfeld 7"/>
+          <p:cNvSpPr txBox="1"/>
+          <p:nvPr/>
+        </p:nvSpPr>
+        <p:spPr>
+          <a:xfrm>
+            <a:off x="7092280" y="5301208"/>
+            <a:ext cx="1584176" cy="707886"/>
+          </a:xfrm>
+          <a:prstGeom prst="rect">
+            <a:avLst/>
+          </a:prstGeom>
+          <a:noFill/>
+        </p:spPr>
+        <p:txBody>
+          <a:bodyPr wrap="square" rtlCol="0">
+            <a:spAutoFit/>
+          </a:bodyPr>
+          <a:lstStyle/>
+          <a:p>
+            <a:r>
+              <a:rPr lang="de-DE" sz="2000" dirty="0" smtClean="0"/>
+              <a:t>Suchbereiche</a:t>
+            </a:r>
+          </a:p>
+          <a:p>
+            <a:r>
+              <a:rPr lang="de-DE" sz="2000" dirty="0" smtClean="0"/>
+              <a:t>auswählen</a:t>
+            </a:r>
+          </a:p>
+        </p:txBody>
+      </p:sp>
     </p:spTree>
   </p:cSld>
   <p:clrMapOvr>
@@ -9276,7 +9370,7 @@
               <a:pPr>
                 <a:defRPr/>
               </a:pPr>
-              <a:t>17.08.2017</a:t>
+              <a:t>25.08.2017</a:t>
             </a:fld>
             <a:endParaRPr lang="de-DE" dirty="0"/>
           </a:p>
@@ -9358,7 +9452,7 @@
       </p:sp>
       <p:pic>
         <p:nvPicPr>
-          <p:cNvPr id="41986" name="Picture 2" descr="C:\Users\kreme\Documents\SuchTool\Praesentation\blubb.png"/>
+          <p:cNvPr id="43010" name="Picture 2" descr="C:\Users\kreme\Documents\SuchTool\Bilder\e.png"/>
           <p:cNvPicPr>
             <a:picLocks noGrp="1" noChangeAspect="1" noChangeArrowheads="1"/>
           </p:cNvPicPr>
@@ -9375,8 +9469,8 @@
         </p:blipFill>
         <p:spPr bwMode="auto">
           <a:xfrm>
-            <a:off x="1198388" y="1268413"/>
-            <a:ext cx="6745637" cy="5040312"/>
+            <a:off x="180000" y="1412775"/>
+            <a:ext cx="3372321" cy="4758402"/>
           </a:xfrm>
           <a:prstGeom prst="rect">
             <a:avLst/>
@@ -9384,6 +9478,36 @@
           <a:noFill/>
         </p:spPr>
       </p:pic>
+      <p:sp>
+        <p:nvSpPr>
+          <p:cNvPr id="8" name="Textfeld 7"/>
+          <p:cNvSpPr txBox="1"/>
+          <p:nvPr/>
+        </p:nvSpPr>
+        <p:spPr>
+          <a:xfrm>
+            <a:off x="3923928" y="1916832"/>
+            <a:ext cx="3024336" cy="400110"/>
+          </a:xfrm>
+          <a:prstGeom prst="rect">
+            <a:avLst/>
+          </a:prstGeom>
+          <a:noFill/>
+        </p:spPr>
+        <p:txBody>
+          <a:bodyPr wrap="square" rtlCol="0">
+            <a:spAutoFit/>
+          </a:bodyPr>
+          <a:lstStyle/>
+          <a:p>
+            <a:r>
+              <a:rPr lang="de-DE" sz="2000" dirty="0" smtClean="0"/>
+              <a:t>Freitextsuche auswählen</a:t>
+            </a:r>
+            <a:endParaRPr lang="de-DE" sz="2000" dirty="0"/>
+          </a:p>
+        </p:txBody>
+      </p:sp>
     </p:spTree>
   </p:cSld>
   <p:clrMapOvr>
@@ -9432,7 +9556,7 @@
               <a:pPr>
                 <a:defRPr/>
               </a:pPr>
-              <a:t>17.08.2017</a:t>
+              <a:t>25.08.2017</a:t>
             </a:fld>
             <a:endParaRPr lang="de-DE" dirty="0"/>
           </a:p>
@@ -9514,7 +9638,7 @@
       </p:sp>
       <p:pic>
         <p:nvPicPr>
-          <p:cNvPr id="43010" name="Picture 2" descr="C:\Users\kreme\Documents\SuchTool\Praesentation\blaaaaaa.png"/>
+          <p:cNvPr id="45058" name="Picture 2" descr="C:\Users\kreme\Documents\SuchTool\Bilder\f.png"/>
           <p:cNvPicPr>
             <a:picLocks noGrp="1" noChangeAspect="1" noChangeArrowheads="1"/>
           </p:cNvPicPr>
@@ -9531,8 +9655,8 @@
         </p:blipFill>
         <p:spPr bwMode="auto">
           <a:xfrm>
-            <a:off x="1200352" y="1268413"/>
-            <a:ext cx="6741708" cy="5040312"/>
+            <a:off x="180000" y="1080000"/>
+            <a:ext cx="6759128" cy="5040312"/>
           </a:xfrm>
           <a:prstGeom prst="rect">
             <a:avLst/>
@@ -9588,7 +9712,7 @@
               <a:pPr>
                 <a:defRPr/>
               </a:pPr>
-              <a:t>17.08.2017</a:t>
+              <a:t>25.08.2017</a:t>
             </a:fld>
             <a:endParaRPr lang="de-DE" dirty="0"/>
           </a:p>
@@ -9670,7 +9794,7 @@
       </p:sp>
       <p:pic>
         <p:nvPicPr>
-          <p:cNvPr id="44034" name="Picture 2" descr="C:\Users\kreme\Documents\SuchTool\Praesentation\ooooor.png"/>
+          <p:cNvPr id="79874" name="Picture 2" descr="C:\Users\kreme\Documents\SuchTool\Bilder\dfki.png"/>
           <p:cNvPicPr>
             <a:picLocks noGrp="1" noChangeAspect="1" noChangeArrowheads="1"/>
           </p:cNvPicPr>
@@ -9687,8 +9811,8 @@
         </p:blipFill>
         <p:spPr bwMode="auto">
           <a:xfrm>
-            <a:off x="1210998" y="1268413"/>
-            <a:ext cx="6720416" cy="5040312"/>
+            <a:off x="180000" y="2160000"/>
+            <a:ext cx="8640763" cy="2136795"/>
           </a:xfrm>
           <a:prstGeom prst="rect">
             <a:avLst/>
@@ -9696,6 +9820,40 @@
           <a:noFill/>
         </p:spPr>
       </p:pic>
+      <p:sp>
+        <p:nvSpPr>
+          <p:cNvPr id="8" name="Textfeld 7"/>
+          <p:cNvSpPr txBox="1"/>
+          <p:nvPr/>
+        </p:nvSpPr>
+        <p:spPr>
+          <a:xfrm>
+            <a:off x="180000" y="1080000"/>
+            <a:ext cx="2255126" cy="401200"/>
+          </a:xfrm>
+          <a:prstGeom prst="rect">
+            <a:avLst/>
+          </a:prstGeom>
+          <a:noFill/>
+        </p:spPr>
+        <p:txBody>
+          <a:bodyPr wrap="none" lIns="90000" tIns="46800" rtlCol="0">
+            <a:spAutoFit/>
+          </a:bodyPr>
+          <a:lstStyle/>
+          <a:p>
+            <a:pPr>
+              <a:buFont typeface="Arial" pitchFamily="34" charset="0"/>
+              <a:buChar char="•"/>
+            </a:pPr>
+            <a:r>
+              <a:rPr lang="de-DE" sz="2000" dirty="0" smtClean="0"/>
+              <a:t> Suchtext eingeben</a:t>
+            </a:r>
+            <a:endParaRPr lang="de-DE" sz="2000" dirty="0"/>
+          </a:p>
+        </p:txBody>
+      </p:sp>
     </p:spTree>
   </p:cSld>
   <p:clrMapOvr>
@@ -9742,11 +9900,7 @@
             </a:pPr>
             <a:r>
               <a:rPr lang="de-DE" dirty="0" smtClean="0"/>
-              <a:t> Hauptanwendungsfall </a:t>
-            </a:r>
-            <a:r>
-              <a:rPr lang="de-DE" dirty="0" smtClean="0"/>
-              <a:t>E-Mail Postfach </a:t>
+              <a:t> Hauptanwendungsfall E-Mail Postfach </a:t>
             </a:r>
           </a:p>
           <a:p>
@@ -9756,11 +9910,7 @@
             </a:pPr>
             <a:r>
               <a:rPr lang="de-DE" dirty="0" smtClean="0"/>
-              <a:t> Semistrukturierte </a:t>
-            </a:r>
-            <a:r>
-              <a:rPr lang="de-DE" dirty="0" smtClean="0"/>
-              <a:t>Dokumente</a:t>
+              <a:t> Semistrukturierte Dokumente</a:t>
             </a:r>
           </a:p>
           <a:p>
@@ -9924,7 +10074,7 @@
               <a:pPr>
                 <a:defRPr/>
               </a:pPr>
-              <a:t>17.08.2017</a:t>
+              <a:t>25.08.2017</a:t>
             </a:fld>
             <a:endParaRPr lang="de-DE" dirty="0"/>
           </a:p>
@@ -10006,7 +10156,7 @@
       </p:sp>
       <p:pic>
         <p:nvPicPr>
-          <p:cNvPr id="45059" name="Picture 3" descr="C:\Users\kreme\Documents\SuchTool\Praesentation\aaaaalll.png"/>
+          <p:cNvPr id="80898" name="Picture 2" descr="C:\Users\kreme\Documents\SuchTool\Bilder\add.png"/>
           <p:cNvPicPr>
             <a:picLocks noGrp="1" noChangeAspect="1" noChangeArrowheads="1"/>
           </p:cNvPicPr>
@@ -10023,8 +10173,8 @@
         </p:blipFill>
         <p:spPr bwMode="auto">
           <a:xfrm>
-            <a:off x="1192567" y="1268413"/>
-            <a:ext cx="6757278" cy="5040312"/>
+            <a:off x="180000" y="2160000"/>
+            <a:ext cx="8640763" cy="2136795"/>
           </a:xfrm>
           <a:prstGeom prst="rect">
             <a:avLst/>
@@ -10032,6 +10182,40 @@
           <a:noFill/>
         </p:spPr>
       </p:pic>
+      <p:sp>
+        <p:nvSpPr>
+          <p:cNvPr id="8" name="Textfeld 7"/>
+          <p:cNvSpPr txBox="1"/>
+          <p:nvPr/>
+        </p:nvSpPr>
+        <p:spPr>
+          <a:xfrm>
+            <a:off x="180000" y="1080000"/>
+            <a:ext cx="2684153" cy="400110"/>
+          </a:xfrm>
+          <a:prstGeom prst="rect">
+            <a:avLst/>
+          </a:prstGeom>
+          <a:noFill/>
+        </p:spPr>
+        <p:txBody>
+          <a:bodyPr wrap="none" lIns="90000" rtlCol="0">
+            <a:spAutoFit/>
+          </a:bodyPr>
+          <a:lstStyle/>
+          <a:p>
+            <a:pPr>
+              <a:buFont typeface="Arial" pitchFamily="34" charset="0"/>
+              <a:buChar char="•"/>
+            </a:pPr>
+            <a:r>
+              <a:rPr lang="de-DE" sz="2000" dirty="0" smtClean="0"/>
+              <a:t> Teilanfrage hinzufügen</a:t>
+            </a:r>
+            <a:endParaRPr lang="de-DE" sz="2000" dirty="0"/>
+          </a:p>
+        </p:txBody>
+      </p:sp>
     </p:spTree>
   </p:cSld>
   <p:clrMapOvr>
@@ -10080,7 +10264,7 @@
               <a:pPr>
                 <a:defRPr/>
               </a:pPr>
-              <a:t>17.08.2017</a:t>
+              <a:t>25.08.2017</a:t>
             </a:fld>
             <a:endParaRPr lang="de-DE" dirty="0"/>
           </a:p>
@@ -10156,13 +10340,16 @@
               <a:rPr lang="de-DE" dirty="0" smtClean="0"/>
               <a:t>Benutzeroberfläche und Bedienung</a:t>
             </a:r>
+            <a:br>
+              <a:rPr lang="de-DE" dirty="0" smtClean="0"/>
+            </a:br>
             <a:endParaRPr lang="de-DE" dirty="0"/>
           </a:p>
         </p:txBody>
       </p:sp>
       <p:pic>
         <p:nvPicPr>
-          <p:cNvPr id="46082" name="Picture 2" descr="C:\Users\kreme\Documents\SuchTool\Praesentation\search.png"/>
+          <p:cNvPr id="40962" name="Picture 2" descr="C:\Users\kreme\Documents\SuchTool\Bilder\blubb.png"/>
           <p:cNvPicPr>
             <a:picLocks noGrp="1" noChangeAspect="1" noChangeArrowheads="1"/>
           </p:cNvPicPr>
@@ -10179,8 +10366,8 @@
         </p:blipFill>
         <p:spPr bwMode="auto">
           <a:xfrm>
-            <a:off x="1195477" y="1268413"/>
-            <a:ext cx="6751458" cy="5040312"/>
+            <a:off x="180000" y="1080000"/>
+            <a:ext cx="6755297" cy="5040312"/>
           </a:xfrm>
           <a:prstGeom prst="rect">
             <a:avLst/>
@@ -10236,7 +10423,7 @@
               <a:pPr>
                 <a:defRPr/>
               </a:pPr>
-              <a:t>17.08.2017</a:t>
+              <a:t>25.08.2017</a:t>
             </a:fld>
             <a:endParaRPr lang="de-DE" dirty="0"/>
           </a:p>
@@ -10312,13 +10499,16 @@
               <a:rPr lang="de-DE" dirty="0" smtClean="0"/>
               <a:t>Benutzeroberfläche und Bedienung</a:t>
             </a:r>
+            <a:br>
+              <a:rPr lang="de-DE" dirty="0" smtClean="0"/>
+            </a:br>
             <a:endParaRPr lang="de-DE" dirty="0"/>
           </a:p>
         </p:txBody>
       </p:sp>
       <p:pic>
         <p:nvPicPr>
-          <p:cNvPr id="48130" name="Picture 2" descr="C:\Users\kreme\Documents\SuchTool\Praesentation\Metadatensuche.png"/>
+          <p:cNvPr id="41986" name="Picture 2" descr="C:\Users\kreme\Documents\SuchTool\Bilder\2.png"/>
           <p:cNvPicPr>
             <a:picLocks noGrp="1" noChangeAspect="1" noChangeArrowheads="1"/>
           </p:cNvPicPr>
@@ -10335,8 +10525,8 @@
         </p:blipFill>
         <p:spPr bwMode="auto">
           <a:xfrm>
-            <a:off x="1193557" y="1268413"/>
-            <a:ext cx="6755298" cy="5040312"/>
+            <a:off x="250825" y="2926039"/>
+            <a:ext cx="8640763" cy="1725059"/>
           </a:xfrm>
           <a:prstGeom prst="rect">
             <a:avLst/>
@@ -10344,6 +10534,40 @@
           <a:noFill/>
         </p:spPr>
       </p:pic>
+      <p:sp>
+        <p:nvSpPr>
+          <p:cNvPr id="9" name="Textfeld 8"/>
+          <p:cNvSpPr txBox="1"/>
+          <p:nvPr/>
+        </p:nvSpPr>
+        <p:spPr>
+          <a:xfrm>
+            <a:off x="180000" y="1080000"/>
+            <a:ext cx="1144993" cy="400110"/>
+          </a:xfrm>
+          <a:prstGeom prst="rect">
+            <a:avLst/>
+          </a:prstGeom>
+          <a:noFill/>
+        </p:spPr>
+        <p:txBody>
+          <a:bodyPr wrap="none" rtlCol="0">
+            <a:spAutoFit/>
+          </a:bodyPr>
+          <a:lstStyle/>
+          <a:p>
+            <a:pPr>
+              <a:buFont typeface="Arial" pitchFamily="34" charset="0"/>
+              <a:buChar char="•"/>
+            </a:pPr>
+            <a:r>
+              <a:rPr lang="de-DE" sz="2000" dirty="0" smtClean="0"/>
+              <a:t> Anzeige</a:t>
+            </a:r>
+            <a:endParaRPr lang="de-DE" sz="2000" dirty="0"/>
+          </a:p>
+        </p:txBody>
+      </p:sp>
     </p:spTree>
   </p:cSld>
   <p:clrMapOvr>
@@ -10392,7 +10616,7 @@
               <a:pPr>
                 <a:defRPr/>
               </a:pPr>
-              <a:t>17.08.2017</a:t>
+              <a:t>25.08.2017</a:t>
             </a:fld>
             <a:endParaRPr lang="de-DE" dirty="0"/>
           </a:p>
@@ -10474,7 +10698,7 @@
       </p:sp>
       <p:pic>
         <p:nvPicPr>
-          <p:cNvPr id="49154" name="Picture 2" descr="C:\Users\kreme\Documents\SuchTool\Praesentation\freitextsuche.png"/>
+          <p:cNvPr id="43010" name="Picture 2" descr="C:\Users\kreme\Documents\SuchTool\Bilder\3.png"/>
           <p:cNvPicPr>
             <a:picLocks noGrp="1" noChangeAspect="1" noChangeArrowheads="1"/>
           </p:cNvPicPr>
@@ -10491,8 +10715,8 @@
         </p:blipFill>
         <p:spPr bwMode="auto">
           <a:xfrm>
-            <a:off x="1193557" y="1268413"/>
-            <a:ext cx="6755298" cy="5040312"/>
+            <a:off x="250825" y="2926039"/>
+            <a:ext cx="8640763" cy="1725059"/>
           </a:xfrm>
           <a:prstGeom prst="rect">
             <a:avLst/>
@@ -10500,6 +10724,40 @@
           <a:noFill/>
         </p:spPr>
       </p:pic>
+      <p:sp>
+        <p:nvSpPr>
+          <p:cNvPr id="10" name="Textfeld 9"/>
+          <p:cNvSpPr txBox="1"/>
+          <p:nvPr/>
+        </p:nvSpPr>
+        <p:spPr>
+          <a:xfrm>
+            <a:off x="180000" y="1080000"/>
+            <a:ext cx="2232248" cy="400110"/>
+          </a:xfrm>
+          <a:prstGeom prst="rect">
+            <a:avLst/>
+          </a:prstGeom>
+          <a:noFill/>
+        </p:spPr>
+        <p:txBody>
+          <a:bodyPr wrap="square" rtlCol="0">
+            <a:spAutoFit/>
+          </a:bodyPr>
+          <a:lstStyle/>
+          <a:p>
+            <a:pPr>
+              <a:buFont typeface="Arial" pitchFamily="34" charset="0"/>
+              <a:buChar char="•"/>
+            </a:pPr>
+            <a:r>
+              <a:rPr lang="de-DE" sz="2000" dirty="0" smtClean="0"/>
+              <a:t> Anzeige</a:t>
+            </a:r>
+            <a:endParaRPr lang="de-DE" sz="2000" dirty="0"/>
+          </a:p>
+        </p:txBody>
+      </p:sp>
     </p:spTree>
   </p:cSld>
   <p:clrMapOvr>
@@ -10527,87 +10785,6 @@
       </p:grpSpPr>
       <p:sp>
         <p:nvSpPr>
-          <p:cNvPr id="2" name="Inhaltsplatzhalter 1"/>
-          <p:cNvSpPr>
-            <a:spLocks noGrp="1"/>
-          </p:cNvSpPr>
-          <p:nvPr>
-            <p:ph sz="quarter" idx="13"/>
-          </p:nvPr>
-        </p:nvSpPr>
-        <p:spPr/>
-        <p:txBody>
-          <a:bodyPr/>
-          <a:lstStyle/>
-          <a:p>
-            <a:pPr>
-              <a:buFont typeface="Arial" pitchFamily="34" charset="0"/>
-              <a:buChar char="•"/>
-            </a:pPr>
-            <a:r>
-              <a:rPr lang="de-DE" dirty="0" smtClean="0">
-                <a:hlinkClick r:id="rId2"/>
-              </a:rPr>
-              <a:t>https://de.wikipedia.org/wiki/Google</a:t>
-            </a:r>
-            <a:endParaRPr lang="de-DE" dirty="0" smtClean="0"/>
-          </a:p>
-          <a:p>
-            <a:pPr>
-              <a:buFont typeface="Arial" pitchFamily="34" charset="0"/>
-              <a:buChar char="•"/>
-            </a:pPr>
-            <a:r>
-              <a:rPr lang="de-DE" dirty="0" smtClean="0">
-                <a:hlinkClick r:id="rId3"/>
-              </a:rPr>
-              <a:t>http://www.underconsideration.com/brandnew/archives/new_logo_for_bing.php</a:t>
-            </a:r>
-            <a:endParaRPr lang="de-DE" dirty="0" smtClean="0"/>
-          </a:p>
-          <a:p>
-            <a:pPr>
-              <a:buFont typeface="Arial" pitchFamily="34" charset="0"/>
-              <a:buChar char="•"/>
-            </a:pPr>
-            <a:r>
-              <a:rPr lang="de-DE" dirty="0" smtClean="0">
-                <a:hlinkClick r:id="rId4"/>
-              </a:rPr>
-              <a:t>http://bibserv.fh-trier.de:8080/webOPACClient/search.do?methodToCall=start</a:t>
-            </a:r>
-            <a:endParaRPr lang="de-DE" dirty="0" smtClean="0"/>
-          </a:p>
-          <a:p>
-            <a:pPr>
-              <a:buFont typeface="Arial" pitchFamily="34" charset="0"/>
-              <a:buChar char="•"/>
-            </a:pPr>
-            <a:r>
-              <a:rPr lang="de-DE" dirty="0" smtClean="0">
-                <a:hlinkClick r:id="rId5"/>
-              </a:rPr>
-              <a:t>http://www.arbeitstipps.de/email-postfach-aufraeumen-3-tipps.html</a:t>
-            </a:r>
-            <a:endParaRPr lang="de-DE" dirty="0" smtClean="0"/>
-          </a:p>
-          <a:p>
-            <a:endParaRPr lang="de-DE" dirty="0" smtClean="0"/>
-          </a:p>
-          <a:p>
-            <a:pPr>
-              <a:buFont typeface="Arial" pitchFamily="34" charset="0"/>
-              <a:buChar char="•"/>
-            </a:pPr>
-            <a:endParaRPr lang="de-DE" dirty="0" smtClean="0"/>
-          </a:p>
-          <a:p>
-            <a:endParaRPr lang="de-DE" dirty="0"/>
-          </a:p>
-        </p:txBody>
-      </p:sp>
-      <p:sp>
-        <p:nvSpPr>
           <p:cNvPr id="3" name="Datumsplatzhalter 2"/>
           <p:cNvSpPr>
             <a:spLocks noGrp="1"/>
@@ -10629,7 +10806,7 @@
               <a:pPr>
                 <a:defRPr/>
               </a:pPr>
-              <a:t>17.08.2017</a:t>
+              <a:t>25.08.2017</a:t>
             </a:fld>
             <a:endParaRPr lang="de-DE" dirty="0"/>
           </a:p>
@@ -10703,24 +10880,855 @@
           <a:p>
             <a:r>
               <a:rPr lang="de-DE" dirty="0" smtClean="0"/>
-              <a:t>Bildquellen</a:t>
+              <a:t>Benutzeroberfläche und Bedienung</a:t>
             </a:r>
             <a:endParaRPr lang="de-DE" dirty="0"/>
           </a:p>
         </p:txBody>
       </p:sp>
+      <p:pic>
+        <p:nvPicPr>
+          <p:cNvPr id="44034" name="Picture 2" descr="C:\Users\kreme\Documents\SuchTool\Bilder\4.png"/>
+          <p:cNvPicPr>
+            <a:picLocks noGrp="1" noChangeAspect="1" noChangeArrowheads="1"/>
+          </p:cNvPicPr>
+          <p:nvPr>
+            <p:ph sz="quarter" idx="13"/>
+          </p:nvPr>
+        </p:nvPicPr>
+        <p:blipFill>
+          <a:blip r:embed="rId2" cstate="print"/>
+          <a:srcRect/>
+          <a:stretch>
+            <a:fillRect/>
+          </a:stretch>
+        </p:blipFill>
+        <p:spPr bwMode="auto">
+          <a:xfrm>
+            <a:off x="250825" y="2926039"/>
+            <a:ext cx="8640763" cy="1725059"/>
+          </a:xfrm>
+          <a:prstGeom prst="rect">
+            <a:avLst/>
+          </a:prstGeom>
+          <a:noFill/>
+        </p:spPr>
+      </p:pic>
     </p:spTree>
   </p:cSld>
   <p:clrMapOvr>
     <a:masterClrMapping/>
   </p:clrMapOvr>
-  <p:timing>
-    <p:tnLst>
-      <p:par>
-        <p:cTn id="1" dur="indefinite" restart="never" nodeType="tmRoot"/>
-      </p:par>
-    </p:tnLst>
-  </p:timing>
+</p:sld>
+</file>
+
+<file path=ppt/slides/slide35.xml><?xml version="1.0" encoding="utf-8"?>
+<p:sld xmlns:a="http://schemas.openxmlformats.org/drawingml/2006/main" xmlns:r="http://schemas.openxmlformats.org/officeDocument/2006/relationships" xmlns:p="http://schemas.openxmlformats.org/presentationml/2006/main">
+  <p:cSld>
+    <p:spTree>
+      <p:nvGrpSpPr>
+        <p:cNvPr id="1" name=""/>
+        <p:cNvGrpSpPr/>
+        <p:nvPr/>
+      </p:nvGrpSpPr>
+      <p:grpSpPr>
+        <a:xfrm>
+          <a:off x="0" y="0"/>
+          <a:ext cx="0" cy="0"/>
+          <a:chOff x="0" y="0"/>
+          <a:chExt cx="0" cy="0"/>
+        </a:xfrm>
+      </p:grpSpPr>
+      <p:sp>
+        <p:nvSpPr>
+          <p:cNvPr id="3" name="Datumsplatzhalter 2"/>
+          <p:cNvSpPr>
+            <a:spLocks noGrp="1"/>
+          </p:cNvSpPr>
+          <p:nvPr>
+            <p:ph type="dt" sz="half" idx="14"/>
+          </p:nvPr>
+        </p:nvSpPr>
+        <p:spPr/>
+        <p:txBody>
+          <a:bodyPr/>
+          <a:lstStyle/>
+          <a:p>
+            <a:pPr>
+              <a:defRPr/>
+            </a:pPr>
+            <a:fld id="{EE9AC89C-B0F3-4179-9BF1-A11BD48F530E}" type="datetime1">
+              <a:rPr lang="de-DE" smtClean="0"/>
+              <a:pPr>
+                <a:defRPr/>
+              </a:pPr>
+              <a:t>25.08.2017</a:t>
+            </a:fld>
+            <a:endParaRPr lang="de-DE" dirty="0"/>
+          </a:p>
+        </p:txBody>
+      </p:sp>
+      <p:sp>
+        <p:nvSpPr>
+          <p:cNvPr id="4" name="Fußzeilenplatzhalter 3"/>
+          <p:cNvSpPr>
+            <a:spLocks noGrp="1"/>
+          </p:cNvSpPr>
+          <p:nvPr>
+            <p:ph type="ftr" sz="quarter" idx="15"/>
+          </p:nvPr>
+        </p:nvSpPr>
+        <p:spPr/>
+        <p:txBody>
+          <a:bodyPr/>
+          <a:lstStyle/>
+          <a:p>
+            <a:pPr>
+              <a:defRPr/>
+            </a:pPr>
+            <a:endParaRPr lang="de-DE"/>
+          </a:p>
+        </p:txBody>
+      </p:sp>
+      <p:sp>
+        <p:nvSpPr>
+          <p:cNvPr id="5" name="Foliennummernplatzhalter 4"/>
+          <p:cNvSpPr>
+            <a:spLocks noGrp="1"/>
+          </p:cNvSpPr>
+          <p:nvPr>
+            <p:ph type="sldNum" sz="quarter" idx="16"/>
+          </p:nvPr>
+        </p:nvSpPr>
+        <p:spPr/>
+        <p:txBody>
+          <a:bodyPr/>
+          <a:lstStyle/>
+          <a:p>
+            <a:pPr>
+              <a:defRPr/>
+            </a:pPr>
+            <a:fld id="{B53A9DA1-A25A-429F-A02C-54EE5606360E}" type="slidenum">
+              <a:rPr lang="de-DE" altLang="de-DE" smtClean="0"/>
+              <a:pPr>
+                <a:defRPr/>
+              </a:pPr>
+              <a:t>35</a:t>
+            </a:fld>
+            <a:endParaRPr lang="de-DE" altLang="de-DE" dirty="0"/>
+          </a:p>
+        </p:txBody>
+      </p:sp>
+      <p:sp>
+        <p:nvSpPr>
+          <p:cNvPr id="6" name="Titel 5"/>
+          <p:cNvSpPr>
+            <a:spLocks noGrp="1"/>
+          </p:cNvSpPr>
+          <p:nvPr>
+            <p:ph type="title"/>
+          </p:nvPr>
+        </p:nvSpPr>
+        <p:spPr/>
+        <p:txBody>
+          <a:bodyPr/>
+          <a:lstStyle/>
+          <a:p>
+            <a:r>
+              <a:rPr lang="de-DE" dirty="0" smtClean="0"/>
+              <a:t>Benutzeroberfläche und Bedienung</a:t>
+            </a:r>
+            <a:endParaRPr lang="de-DE" dirty="0"/>
+          </a:p>
+        </p:txBody>
+      </p:sp>
+      <p:pic>
+        <p:nvPicPr>
+          <p:cNvPr id="45058" name="Picture 2" descr="C:\Users\kreme\Documents\SuchTool\Bilder\5.png"/>
+          <p:cNvPicPr>
+            <a:picLocks noGrp="1" noChangeAspect="1" noChangeArrowheads="1"/>
+          </p:cNvPicPr>
+          <p:nvPr>
+            <p:ph sz="quarter" idx="13"/>
+          </p:nvPr>
+        </p:nvPicPr>
+        <p:blipFill>
+          <a:blip r:embed="rId2" cstate="print"/>
+          <a:srcRect/>
+          <a:stretch>
+            <a:fillRect/>
+          </a:stretch>
+        </p:blipFill>
+        <p:spPr bwMode="auto">
+          <a:xfrm>
+            <a:off x="250825" y="2926039"/>
+            <a:ext cx="8640763" cy="1725059"/>
+          </a:xfrm>
+          <a:prstGeom prst="rect">
+            <a:avLst/>
+          </a:prstGeom>
+          <a:noFill/>
+        </p:spPr>
+      </p:pic>
+    </p:spTree>
+  </p:cSld>
+  <p:clrMapOvr>
+    <a:masterClrMapping/>
+  </p:clrMapOvr>
+</p:sld>
+</file>
+
+<file path=ppt/slides/slide36.xml><?xml version="1.0" encoding="utf-8"?>
+<p:sld xmlns:a="http://schemas.openxmlformats.org/drawingml/2006/main" xmlns:r="http://schemas.openxmlformats.org/officeDocument/2006/relationships" xmlns:p="http://schemas.openxmlformats.org/presentationml/2006/main">
+  <p:cSld>
+    <p:spTree>
+      <p:nvGrpSpPr>
+        <p:cNvPr id="1" name=""/>
+        <p:cNvGrpSpPr/>
+        <p:nvPr/>
+      </p:nvGrpSpPr>
+      <p:grpSpPr>
+        <a:xfrm>
+          <a:off x="0" y="0"/>
+          <a:ext cx="0" cy="0"/>
+          <a:chOff x="0" y="0"/>
+          <a:chExt cx="0" cy="0"/>
+        </a:xfrm>
+      </p:grpSpPr>
+      <p:sp>
+        <p:nvSpPr>
+          <p:cNvPr id="3" name="Datumsplatzhalter 2"/>
+          <p:cNvSpPr>
+            <a:spLocks noGrp="1"/>
+          </p:cNvSpPr>
+          <p:nvPr>
+            <p:ph type="dt" sz="half" idx="14"/>
+          </p:nvPr>
+        </p:nvSpPr>
+        <p:spPr/>
+        <p:txBody>
+          <a:bodyPr/>
+          <a:lstStyle/>
+          <a:p>
+            <a:pPr>
+              <a:defRPr/>
+            </a:pPr>
+            <a:fld id="{EE9AC89C-B0F3-4179-9BF1-A11BD48F530E}" type="datetime1">
+              <a:rPr lang="de-DE" smtClean="0"/>
+              <a:pPr>
+                <a:defRPr/>
+              </a:pPr>
+              <a:t>25.08.2017</a:t>
+            </a:fld>
+            <a:endParaRPr lang="de-DE" dirty="0"/>
+          </a:p>
+        </p:txBody>
+      </p:sp>
+      <p:sp>
+        <p:nvSpPr>
+          <p:cNvPr id="4" name="Fußzeilenplatzhalter 3"/>
+          <p:cNvSpPr>
+            <a:spLocks noGrp="1"/>
+          </p:cNvSpPr>
+          <p:nvPr>
+            <p:ph type="ftr" sz="quarter" idx="15"/>
+          </p:nvPr>
+        </p:nvSpPr>
+        <p:spPr/>
+        <p:txBody>
+          <a:bodyPr/>
+          <a:lstStyle/>
+          <a:p>
+            <a:pPr>
+              <a:defRPr/>
+            </a:pPr>
+            <a:endParaRPr lang="de-DE"/>
+          </a:p>
+        </p:txBody>
+      </p:sp>
+      <p:sp>
+        <p:nvSpPr>
+          <p:cNvPr id="5" name="Foliennummernplatzhalter 4"/>
+          <p:cNvSpPr>
+            <a:spLocks noGrp="1"/>
+          </p:cNvSpPr>
+          <p:nvPr>
+            <p:ph type="sldNum" sz="quarter" idx="16"/>
+          </p:nvPr>
+        </p:nvSpPr>
+        <p:spPr/>
+        <p:txBody>
+          <a:bodyPr/>
+          <a:lstStyle/>
+          <a:p>
+            <a:pPr>
+              <a:defRPr/>
+            </a:pPr>
+            <a:fld id="{B53A9DA1-A25A-429F-A02C-54EE5606360E}" type="slidenum">
+              <a:rPr lang="de-DE" altLang="de-DE" smtClean="0"/>
+              <a:pPr>
+                <a:defRPr/>
+              </a:pPr>
+              <a:t>36</a:t>
+            </a:fld>
+            <a:endParaRPr lang="de-DE" altLang="de-DE" dirty="0"/>
+          </a:p>
+        </p:txBody>
+      </p:sp>
+      <p:sp>
+        <p:nvSpPr>
+          <p:cNvPr id="6" name="Titel 5"/>
+          <p:cNvSpPr>
+            <a:spLocks noGrp="1"/>
+          </p:cNvSpPr>
+          <p:nvPr>
+            <p:ph type="title"/>
+          </p:nvPr>
+        </p:nvSpPr>
+        <p:spPr/>
+        <p:txBody>
+          <a:bodyPr/>
+          <a:lstStyle/>
+          <a:p>
+            <a:r>
+              <a:rPr lang="de-DE" dirty="0" smtClean="0"/>
+              <a:t>Benutzeroberfläche und Bedienung</a:t>
+            </a:r>
+            <a:endParaRPr lang="de-DE" dirty="0"/>
+          </a:p>
+        </p:txBody>
+      </p:sp>
+      <p:pic>
+        <p:nvPicPr>
+          <p:cNvPr id="46082" name="Picture 2" descr="C:\Users\kreme\Documents\SuchTool\Bilder\d.png"/>
+          <p:cNvPicPr>
+            <a:picLocks noGrp="1" noChangeAspect="1" noChangeArrowheads="1"/>
+          </p:cNvPicPr>
+          <p:nvPr>
+            <p:ph sz="quarter" idx="13"/>
+          </p:nvPr>
+        </p:nvPicPr>
+        <p:blipFill>
+          <a:blip r:embed="rId2" cstate="print"/>
+          <a:srcRect/>
+          <a:stretch>
+            <a:fillRect/>
+          </a:stretch>
+        </p:blipFill>
+        <p:spPr bwMode="auto">
+          <a:xfrm>
+            <a:off x="1191642" y="1268413"/>
+            <a:ext cx="6759128" cy="5040312"/>
+          </a:xfrm>
+          <a:prstGeom prst="rect">
+            <a:avLst/>
+          </a:prstGeom>
+          <a:noFill/>
+        </p:spPr>
+      </p:pic>
+    </p:spTree>
+  </p:cSld>
+  <p:clrMapOvr>
+    <a:masterClrMapping/>
+  </p:clrMapOvr>
+</p:sld>
+</file>
+
+<file path=ppt/slides/slide37.xml><?xml version="1.0" encoding="utf-8"?>
+<p:sld xmlns:a="http://schemas.openxmlformats.org/drawingml/2006/main" xmlns:r="http://schemas.openxmlformats.org/officeDocument/2006/relationships" xmlns:p="http://schemas.openxmlformats.org/presentationml/2006/main">
+  <p:cSld>
+    <p:spTree>
+      <p:nvGrpSpPr>
+        <p:cNvPr id="1" name=""/>
+        <p:cNvGrpSpPr/>
+        <p:nvPr/>
+      </p:nvGrpSpPr>
+      <p:grpSpPr>
+        <a:xfrm>
+          <a:off x="0" y="0"/>
+          <a:ext cx="0" cy="0"/>
+          <a:chOff x="0" y="0"/>
+          <a:chExt cx="0" cy="0"/>
+        </a:xfrm>
+      </p:grpSpPr>
+      <p:sp>
+        <p:nvSpPr>
+          <p:cNvPr id="3" name="Datumsplatzhalter 2"/>
+          <p:cNvSpPr>
+            <a:spLocks noGrp="1"/>
+          </p:cNvSpPr>
+          <p:nvPr>
+            <p:ph type="dt" sz="half" idx="14"/>
+          </p:nvPr>
+        </p:nvSpPr>
+        <p:spPr/>
+        <p:txBody>
+          <a:bodyPr/>
+          <a:lstStyle/>
+          <a:p>
+            <a:pPr>
+              <a:defRPr/>
+            </a:pPr>
+            <a:fld id="{EE9AC89C-B0F3-4179-9BF1-A11BD48F530E}" type="datetime1">
+              <a:rPr lang="de-DE" smtClean="0"/>
+              <a:pPr>
+                <a:defRPr/>
+              </a:pPr>
+              <a:t>25.08.2017</a:t>
+            </a:fld>
+            <a:endParaRPr lang="de-DE" dirty="0"/>
+          </a:p>
+        </p:txBody>
+      </p:sp>
+      <p:sp>
+        <p:nvSpPr>
+          <p:cNvPr id="4" name="Fußzeilenplatzhalter 3"/>
+          <p:cNvSpPr>
+            <a:spLocks noGrp="1"/>
+          </p:cNvSpPr>
+          <p:nvPr>
+            <p:ph type="ftr" sz="quarter" idx="15"/>
+          </p:nvPr>
+        </p:nvSpPr>
+        <p:spPr/>
+        <p:txBody>
+          <a:bodyPr/>
+          <a:lstStyle/>
+          <a:p>
+            <a:pPr>
+              <a:defRPr/>
+            </a:pPr>
+            <a:endParaRPr lang="de-DE"/>
+          </a:p>
+        </p:txBody>
+      </p:sp>
+      <p:sp>
+        <p:nvSpPr>
+          <p:cNvPr id="5" name="Foliennummernplatzhalter 4"/>
+          <p:cNvSpPr>
+            <a:spLocks noGrp="1"/>
+          </p:cNvSpPr>
+          <p:nvPr>
+            <p:ph type="sldNum" sz="quarter" idx="16"/>
+          </p:nvPr>
+        </p:nvSpPr>
+        <p:spPr/>
+        <p:txBody>
+          <a:bodyPr/>
+          <a:lstStyle/>
+          <a:p>
+            <a:pPr>
+              <a:defRPr/>
+            </a:pPr>
+            <a:fld id="{B53A9DA1-A25A-429F-A02C-54EE5606360E}" type="slidenum">
+              <a:rPr lang="de-DE" altLang="de-DE" smtClean="0"/>
+              <a:pPr>
+                <a:defRPr/>
+              </a:pPr>
+              <a:t>37</a:t>
+            </a:fld>
+            <a:endParaRPr lang="de-DE" altLang="de-DE" dirty="0"/>
+          </a:p>
+        </p:txBody>
+      </p:sp>
+      <p:sp>
+        <p:nvSpPr>
+          <p:cNvPr id="6" name="Titel 5"/>
+          <p:cNvSpPr>
+            <a:spLocks noGrp="1"/>
+          </p:cNvSpPr>
+          <p:nvPr>
+            <p:ph type="title"/>
+          </p:nvPr>
+        </p:nvSpPr>
+        <p:spPr/>
+        <p:txBody>
+          <a:bodyPr/>
+          <a:lstStyle/>
+          <a:p>
+            <a:r>
+              <a:rPr lang="de-DE" dirty="0" smtClean="0"/>
+              <a:t>Benutzeroberfläche und Bedienung</a:t>
+            </a:r>
+            <a:endParaRPr lang="de-DE" dirty="0"/>
+          </a:p>
+        </p:txBody>
+      </p:sp>
+      <p:pic>
+        <p:nvPicPr>
+          <p:cNvPr id="47106" name="Picture 2" descr="C:\Users\kreme\Documents\SuchTool\Bilder\m.png"/>
+          <p:cNvPicPr>
+            <a:picLocks noGrp="1" noChangeAspect="1" noChangeArrowheads="1"/>
+          </p:cNvPicPr>
+          <p:nvPr>
+            <p:ph sz="quarter" idx="13"/>
+          </p:nvPr>
+        </p:nvPicPr>
+        <p:blipFill>
+          <a:blip r:embed="rId2" cstate="print"/>
+          <a:srcRect/>
+          <a:stretch>
+            <a:fillRect/>
+          </a:stretch>
+        </p:blipFill>
+        <p:spPr bwMode="auto">
+          <a:xfrm>
+            <a:off x="467544" y="1340768"/>
+            <a:ext cx="3456384" cy="4622914"/>
+          </a:xfrm>
+          <a:prstGeom prst="rect">
+            <a:avLst/>
+          </a:prstGeom>
+          <a:noFill/>
+        </p:spPr>
+      </p:pic>
+      <p:sp>
+        <p:nvSpPr>
+          <p:cNvPr id="8" name="Textfeld 7"/>
+          <p:cNvSpPr txBox="1"/>
+          <p:nvPr/>
+        </p:nvSpPr>
+        <p:spPr>
+          <a:xfrm>
+            <a:off x="4283968" y="2132856"/>
+            <a:ext cx="3960440" cy="369332"/>
+          </a:xfrm>
+          <a:prstGeom prst="rect">
+            <a:avLst/>
+          </a:prstGeom>
+          <a:noFill/>
+        </p:spPr>
+        <p:txBody>
+          <a:bodyPr wrap="square" rtlCol="0">
+            <a:spAutoFit/>
+          </a:bodyPr>
+          <a:lstStyle/>
+          <a:p>
+            <a:r>
+              <a:rPr lang="de-DE" dirty="0" smtClean="0"/>
+              <a:t>Metadaten auswählen</a:t>
+            </a:r>
+            <a:endParaRPr lang="de-DE" dirty="0"/>
+          </a:p>
+        </p:txBody>
+      </p:sp>
+    </p:spTree>
+  </p:cSld>
+  <p:clrMapOvr>
+    <a:masterClrMapping/>
+  </p:clrMapOvr>
+</p:sld>
+</file>
+
+<file path=ppt/slides/slide38.xml><?xml version="1.0" encoding="utf-8"?>
+<p:sld xmlns:a="http://schemas.openxmlformats.org/drawingml/2006/main" xmlns:r="http://schemas.openxmlformats.org/officeDocument/2006/relationships" xmlns:p="http://schemas.openxmlformats.org/presentationml/2006/main">
+  <p:cSld>
+    <p:spTree>
+      <p:nvGrpSpPr>
+        <p:cNvPr id="1" name=""/>
+        <p:cNvGrpSpPr/>
+        <p:nvPr/>
+      </p:nvGrpSpPr>
+      <p:grpSpPr>
+        <a:xfrm>
+          <a:off x="0" y="0"/>
+          <a:ext cx="0" cy="0"/>
+          <a:chOff x="0" y="0"/>
+          <a:chExt cx="0" cy="0"/>
+        </a:xfrm>
+      </p:grpSpPr>
+      <p:sp>
+        <p:nvSpPr>
+          <p:cNvPr id="3" name="Datumsplatzhalter 2"/>
+          <p:cNvSpPr>
+            <a:spLocks noGrp="1"/>
+          </p:cNvSpPr>
+          <p:nvPr>
+            <p:ph type="dt" sz="half" idx="14"/>
+          </p:nvPr>
+        </p:nvSpPr>
+        <p:spPr/>
+        <p:txBody>
+          <a:bodyPr/>
+          <a:lstStyle/>
+          <a:p>
+            <a:pPr>
+              <a:defRPr/>
+            </a:pPr>
+            <a:fld id="{EE9AC89C-B0F3-4179-9BF1-A11BD48F530E}" type="datetime1">
+              <a:rPr lang="de-DE" smtClean="0"/>
+              <a:pPr>
+                <a:defRPr/>
+              </a:pPr>
+              <a:t>25.08.2017</a:t>
+            </a:fld>
+            <a:endParaRPr lang="de-DE" dirty="0"/>
+          </a:p>
+        </p:txBody>
+      </p:sp>
+      <p:sp>
+        <p:nvSpPr>
+          <p:cNvPr id="4" name="Fußzeilenplatzhalter 3"/>
+          <p:cNvSpPr>
+            <a:spLocks noGrp="1"/>
+          </p:cNvSpPr>
+          <p:nvPr>
+            <p:ph type="ftr" sz="quarter" idx="15"/>
+          </p:nvPr>
+        </p:nvSpPr>
+        <p:spPr/>
+        <p:txBody>
+          <a:bodyPr/>
+          <a:lstStyle/>
+          <a:p>
+            <a:pPr>
+              <a:defRPr/>
+            </a:pPr>
+            <a:endParaRPr lang="de-DE"/>
+          </a:p>
+        </p:txBody>
+      </p:sp>
+      <p:sp>
+        <p:nvSpPr>
+          <p:cNvPr id="5" name="Foliennummernplatzhalter 4"/>
+          <p:cNvSpPr>
+            <a:spLocks noGrp="1"/>
+          </p:cNvSpPr>
+          <p:nvPr>
+            <p:ph type="sldNum" sz="quarter" idx="16"/>
+          </p:nvPr>
+        </p:nvSpPr>
+        <p:spPr/>
+        <p:txBody>
+          <a:bodyPr/>
+          <a:lstStyle/>
+          <a:p>
+            <a:pPr>
+              <a:defRPr/>
+            </a:pPr>
+            <a:fld id="{B53A9DA1-A25A-429F-A02C-54EE5606360E}" type="slidenum">
+              <a:rPr lang="de-DE" altLang="de-DE" smtClean="0"/>
+              <a:pPr>
+                <a:defRPr/>
+              </a:pPr>
+              <a:t>38</a:t>
+            </a:fld>
+            <a:endParaRPr lang="de-DE" altLang="de-DE" dirty="0"/>
+          </a:p>
+        </p:txBody>
+      </p:sp>
+      <p:sp>
+        <p:nvSpPr>
+          <p:cNvPr id="6" name="Titel 5"/>
+          <p:cNvSpPr>
+            <a:spLocks noGrp="1"/>
+          </p:cNvSpPr>
+          <p:nvPr>
+            <p:ph type="title"/>
+          </p:nvPr>
+        </p:nvSpPr>
+        <p:spPr/>
+        <p:txBody>
+          <a:bodyPr/>
+          <a:lstStyle/>
+          <a:p>
+            <a:r>
+              <a:rPr lang="de-DE" dirty="0" smtClean="0"/>
+              <a:t>Benutzeroberfläche und Bedienung</a:t>
+            </a:r>
+            <a:endParaRPr lang="de-DE" dirty="0"/>
+          </a:p>
+        </p:txBody>
+      </p:sp>
+      <p:pic>
+        <p:nvPicPr>
+          <p:cNvPr id="49154" name="Picture 2" descr="C:\Users\kreme\Documents\SuchTool\Bilder\m_1.png"/>
+          <p:cNvPicPr>
+            <a:picLocks noGrp="1" noChangeAspect="1" noChangeArrowheads="1"/>
+          </p:cNvPicPr>
+          <p:nvPr>
+            <p:ph sz="quarter" idx="13"/>
+          </p:nvPr>
+        </p:nvPicPr>
+        <p:blipFill>
+          <a:blip r:embed="rId2" cstate="print"/>
+          <a:srcRect/>
+          <a:stretch>
+            <a:fillRect/>
+          </a:stretch>
+        </p:blipFill>
+        <p:spPr bwMode="auto">
+          <a:xfrm>
+            <a:off x="180000" y="1080000"/>
+            <a:ext cx="6749585" cy="5040312"/>
+          </a:xfrm>
+          <a:prstGeom prst="rect">
+            <a:avLst/>
+          </a:prstGeom>
+          <a:noFill/>
+        </p:spPr>
+      </p:pic>
+    </p:spTree>
+  </p:cSld>
+  <p:clrMapOvr>
+    <a:masterClrMapping/>
+  </p:clrMapOvr>
+</p:sld>
+</file>
+
+<file path=ppt/slides/slide39.xml><?xml version="1.0" encoding="utf-8"?>
+<p:sld xmlns:a="http://schemas.openxmlformats.org/drawingml/2006/main" xmlns:r="http://schemas.openxmlformats.org/officeDocument/2006/relationships" xmlns:p="http://schemas.openxmlformats.org/presentationml/2006/main">
+  <p:cSld>
+    <p:spTree>
+      <p:nvGrpSpPr>
+        <p:cNvPr id="1" name=""/>
+        <p:cNvGrpSpPr/>
+        <p:nvPr/>
+      </p:nvGrpSpPr>
+      <p:grpSpPr>
+        <a:xfrm>
+          <a:off x="0" y="0"/>
+          <a:ext cx="0" cy="0"/>
+          <a:chOff x="0" y="0"/>
+          <a:chExt cx="0" cy="0"/>
+        </a:xfrm>
+      </p:grpSpPr>
+      <p:sp>
+        <p:nvSpPr>
+          <p:cNvPr id="3" name="Datumsplatzhalter 2"/>
+          <p:cNvSpPr>
+            <a:spLocks noGrp="1"/>
+          </p:cNvSpPr>
+          <p:nvPr>
+            <p:ph type="dt" sz="half" idx="14"/>
+          </p:nvPr>
+        </p:nvSpPr>
+        <p:spPr/>
+        <p:txBody>
+          <a:bodyPr/>
+          <a:lstStyle/>
+          <a:p>
+            <a:pPr>
+              <a:defRPr/>
+            </a:pPr>
+            <a:fld id="{EE9AC89C-B0F3-4179-9BF1-A11BD48F530E}" type="datetime1">
+              <a:rPr lang="de-DE" smtClean="0"/>
+              <a:pPr>
+                <a:defRPr/>
+              </a:pPr>
+              <a:t>25.08.2017</a:t>
+            </a:fld>
+            <a:endParaRPr lang="de-DE" dirty="0"/>
+          </a:p>
+        </p:txBody>
+      </p:sp>
+      <p:sp>
+        <p:nvSpPr>
+          <p:cNvPr id="4" name="Fußzeilenplatzhalter 3"/>
+          <p:cNvSpPr>
+            <a:spLocks noGrp="1"/>
+          </p:cNvSpPr>
+          <p:nvPr>
+            <p:ph type="ftr" sz="quarter" idx="15"/>
+          </p:nvPr>
+        </p:nvSpPr>
+        <p:spPr/>
+        <p:txBody>
+          <a:bodyPr/>
+          <a:lstStyle/>
+          <a:p>
+            <a:pPr>
+              <a:defRPr/>
+            </a:pPr>
+            <a:endParaRPr lang="de-DE"/>
+          </a:p>
+        </p:txBody>
+      </p:sp>
+      <p:sp>
+        <p:nvSpPr>
+          <p:cNvPr id="5" name="Foliennummernplatzhalter 4"/>
+          <p:cNvSpPr>
+            <a:spLocks noGrp="1"/>
+          </p:cNvSpPr>
+          <p:nvPr>
+            <p:ph type="sldNum" sz="quarter" idx="16"/>
+          </p:nvPr>
+        </p:nvSpPr>
+        <p:spPr/>
+        <p:txBody>
+          <a:bodyPr/>
+          <a:lstStyle/>
+          <a:p>
+            <a:pPr>
+              <a:defRPr/>
+            </a:pPr>
+            <a:fld id="{B53A9DA1-A25A-429F-A02C-54EE5606360E}" type="slidenum">
+              <a:rPr lang="de-DE" altLang="de-DE" smtClean="0"/>
+              <a:pPr>
+                <a:defRPr/>
+              </a:pPr>
+              <a:t>39</a:t>
+            </a:fld>
+            <a:endParaRPr lang="de-DE" altLang="de-DE" dirty="0"/>
+          </a:p>
+        </p:txBody>
+      </p:sp>
+      <p:sp>
+        <p:nvSpPr>
+          <p:cNvPr id="6" name="Titel 5"/>
+          <p:cNvSpPr>
+            <a:spLocks noGrp="1"/>
+          </p:cNvSpPr>
+          <p:nvPr>
+            <p:ph type="title"/>
+          </p:nvPr>
+        </p:nvSpPr>
+        <p:spPr/>
+        <p:txBody>
+          <a:bodyPr/>
+          <a:lstStyle/>
+          <a:p>
+            <a:r>
+              <a:rPr lang="de-DE" dirty="0" smtClean="0"/>
+              <a:t>Benutzeroberfläche und Bedienung</a:t>
+            </a:r>
+            <a:endParaRPr lang="de-DE" dirty="0"/>
+          </a:p>
+        </p:txBody>
+      </p:sp>
+      <p:pic>
+        <p:nvPicPr>
+          <p:cNvPr id="50178" name="Picture 2" descr="C:\Users\kreme\Documents\SuchTool\Bilder\n.png"/>
+          <p:cNvPicPr>
+            <a:picLocks noGrp="1" noChangeAspect="1" noChangeArrowheads="1"/>
+          </p:cNvPicPr>
+          <p:nvPr>
+            <p:ph sz="quarter" idx="13"/>
+          </p:nvPr>
+        </p:nvPicPr>
+        <p:blipFill>
+          <a:blip r:embed="rId2" cstate="print"/>
+          <a:srcRect/>
+          <a:stretch>
+            <a:fillRect/>
+          </a:stretch>
+        </p:blipFill>
+        <p:spPr bwMode="auto">
+          <a:xfrm>
+            <a:off x="180000" y="2160000"/>
+            <a:ext cx="8640763" cy="1225586"/>
+          </a:xfrm>
+          <a:prstGeom prst="rect">
+            <a:avLst/>
+          </a:prstGeom>
+          <a:noFill/>
+        </p:spPr>
+      </p:pic>
+    </p:spTree>
+  </p:cSld>
+  <p:clrMapOvr>
+    <a:masterClrMapping/>
+  </p:clrMapOvr>
 </p:sld>
 </file>
 
@@ -10764,7 +11772,6 @@
               <a:rPr lang="de-DE" dirty="0" smtClean="0"/>
               <a:t> Metadatensuche</a:t>
             </a:r>
-            <a:endParaRPr lang="de-DE" dirty="0" smtClean="0"/>
           </a:p>
           <a:p>
             <a:pPr>
@@ -10773,11 +11780,7 @@
             </a:pPr>
             <a:r>
               <a:rPr lang="de-DE" dirty="0" smtClean="0"/>
-              <a:t> Charakterisieren </a:t>
-            </a:r>
-            <a:r>
-              <a:rPr lang="de-DE" dirty="0" smtClean="0"/>
-              <a:t>von Mengen durch Attribute</a:t>
+              <a:t> Charakterisieren von Mengen durch Attribute</a:t>
             </a:r>
           </a:p>
           <a:p>
@@ -10813,7 +11816,6 @@
               <a:rPr lang="de-DE" dirty="0" smtClean="0"/>
               <a:t> Mengenoperationen </a:t>
             </a:r>
-            <a:endParaRPr lang="de-DE" dirty="0" smtClean="0"/>
           </a:p>
           <a:p>
             <a:pPr lvl="1"/>
@@ -10871,7 +11873,7 @@
               <a:pPr>
                 <a:defRPr/>
               </a:pPr>
-              <a:t>17.08.2017</a:t>
+              <a:t>25.08.2017</a:t>
             </a:fld>
             <a:endParaRPr lang="de-DE" dirty="0"/>
           </a:p>
@@ -11022,6 +12024,1526 @@
 </p:sld>
 </file>
 
+<file path=ppt/slides/slide40.xml><?xml version="1.0" encoding="utf-8"?>
+<p:sld xmlns:a="http://schemas.openxmlformats.org/drawingml/2006/main" xmlns:r="http://schemas.openxmlformats.org/officeDocument/2006/relationships" xmlns:p="http://schemas.openxmlformats.org/presentationml/2006/main">
+  <p:cSld>
+    <p:spTree>
+      <p:nvGrpSpPr>
+        <p:cNvPr id="1" name=""/>
+        <p:cNvGrpSpPr/>
+        <p:nvPr/>
+      </p:nvGrpSpPr>
+      <p:grpSpPr>
+        <a:xfrm>
+          <a:off x="0" y="0"/>
+          <a:ext cx="0" cy="0"/>
+          <a:chOff x="0" y="0"/>
+          <a:chExt cx="0" cy="0"/>
+        </a:xfrm>
+      </p:grpSpPr>
+      <p:sp>
+        <p:nvSpPr>
+          <p:cNvPr id="3" name="Datumsplatzhalter 2"/>
+          <p:cNvSpPr>
+            <a:spLocks noGrp="1"/>
+          </p:cNvSpPr>
+          <p:nvPr>
+            <p:ph type="dt" sz="half" idx="14"/>
+          </p:nvPr>
+        </p:nvSpPr>
+        <p:spPr/>
+        <p:txBody>
+          <a:bodyPr/>
+          <a:lstStyle/>
+          <a:p>
+            <a:pPr>
+              <a:defRPr/>
+            </a:pPr>
+            <a:fld id="{EE9AC89C-B0F3-4179-9BF1-A11BD48F530E}" type="datetime1">
+              <a:rPr lang="de-DE" smtClean="0"/>
+              <a:pPr>
+                <a:defRPr/>
+              </a:pPr>
+              <a:t>25.08.2017</a:t>
+            </a:fld>
+            <a:endParaRPr lang="de-DE" dirty="0"/>
+          </a:p>
+        </p:txBody>
+      </p:sp>
+      <p:sp>
+        <p:nvSpPr>
+          <p:cNvPr id="4" name="Fußzeilenplatzhalter 3"/>
+          <p:cNvSpPr>
+            <a:spLocks noGrp="1"/>
+          </p:cNvSpPr>
+          <p:nvPr>
+            <p:ph type="ftr" sz="quarter" idx="15"/>
+          </p:nvPr>
+        </p:nvSpPr>
+        <p:spPr/>
+        <p:txBody>
+          <a:bodyPr/>
+          <a:lstStyle/>
+          <a:p>
+            <a:pPr>
+              <a:defRPr/>
+            </a:pPr>
+            <a:endParaRPr lang="de-DE"/>
+          </a:p>
+        </p:txBody>
+      </p:sp>
+      <p:sp>
+        <p:nvSpPr>
+          <p:cNvPr id="5" name="Foliennummernplatzhalter 4"/>
+          <p:cNvSpPr>
+            <a:spLocks noGrp="1"/>
+          </p:cNvSpPr>
+          <p:nvPr>
+            <p:ph type="sldNum" sz="quarter" idx="16"/>
+          </p:nvPr>
+        </p:nvSpPr>
+        <p:spPr/>
+        <p:txBody>
+          <a:bodyPr/>
+          <a:lstStyle/>
+          <a:p>
+            <a:pPr>
+              <a:defRPr/>
+            </a:pPr>
+            <a:fld id="{B53A9DA1-A25A-429F-A02C-54EE5606360E}" type="slidenum">
+              <a:rPr lang="de-DE" altLang="de-DE" smtClean="0"/>
+              <a:pPr>
+                <a:defRPr/>
+              </a:pPr>
+              <a:t>40</a:t>
+            </a:fld>
+            <a:endParaRPr lang="de-DE" altLang="de-DE" dirty="0"/>
+          </a:p>
+        </p:txBody>
+      </p:sp>
+      <p:sp>
+        <p:nvSpPr>
+          <p:cNvPr id="6" name="Titel 5"/>
+          <p:cNvSpPr>
+            <a:spLocks noGrp="1"/>
+          </p:cNvSpPr>
+          <p:nvPr>
+            <p:ph type="title"/>
+          </p:nvPr>
+        </p:nvSpPr>
+        <p:spPr/>
+        <p:txBody>
+          <a:bodyPr/>
+          <a:lstStyle/>
+          <a:p>
+            <a:r>
+              <a:rPr lang="de-DE" dirty="0" smtClean="0"/>
+              <a:t>Benutzeroberfläche und Bedienung</a:t>
+            </a:r>
+            <a:endParaRPr lang="de-DE" dirty="0"/>
+          </a:p>
+        </p:txBody>
+      </p:sp>
+      <p:pic>
+        <p:nvPicPr>
+          <p:cNvPr id="51202" name="Picture 2" descr="C:\Users\kreme\Documents\SuchTool\Bilder\o.png"/>
+          <p:cNvPicPr>
+            <a:picLocks noGrp="1" noChangeAspect="1" noChangeArrowheads="1"/>
+          </p:cNvPicPr>
+          <p:nvPr>
+            <p:ph sz="quarter" idx="13"/>
+          </p:nvPr>
+        </p:nvPicPr>
+        <p:blipFill>
+          <a:blip r:embed="rId2" cstate="print"/>
+          <a:srcRect/>
+          <a:stretch>
+            <a:fillRect/>
+          </a:stretch>
+        </p:blipFill>
+        <p:spPr bwMode="auto">
+          <a:xfrm>
+            <a:off x="180000" y="2160000"/>
+            <a:ext cx="8640763" cy="1225586"/>
+          </a:xfrm>
+          <a:prstGeom prst="rect">
+            <a:avLst/>
+          </a:prstGeom>
+          <a:noFill/>
+        </p:spPr>
+      </p:pic>
+    </p:spTree>
+  </p:cSld>
+  <p:clrMapOvr>
+    <a:masterClrMapping/>
+  </p:clrMapOvr>
+</p:sld>
+</file>
+
+<file path=ppt/slides/slide41.xml><?xml version="1.0" encoding="utf-8"?>
+<p:sld xmlns:a="http://schemas.openxmlformats.org/drawingml/2006/main" xmlns:r="http://schemas.openxmlformats.org/officeDocument/2006/relationships" xmlns:p="http://schemas.openxmlformats.org/presentationml/2006/main">
+  <p:cSld>
+    <p:spTree>
+      <p:nvGrpSpPr>
+        <p:cNvPr id="1" name=""/>
+        <p:cNvGrpSpPr/>
+        <p:nvPr/>
+      </p:nvGrpSpPr>
+      <p:grpSpPr>
+        <a:xfrm>
+          <a:off x="0" y="0"/>
+          <a:ext cx="0" cy="0"/>
+          <a:chOff x="0" y="0"/>
+          <a:chExt cx="0" cy="0"/>
+        </a:xfrm>
+      </p:grpSpPr>
+      <p:sp>
+        <p:nvSpPr>
+          <p:cNvPr id="3" name="Datumsplatzhalter 2"/>
+          <p:cNvSpPr>
+            <a:spLocks noGrp="1"/>
+          </p:cNvSpPr>
+          <p:nvPr>
+            <p:ph type="dt" sz="half" idx="14"/>
+          </p:nvPr>
+        </p:nvSpPr>
+        <p:spPr/>
+        <p:txBody>
+          <a:bodyPr/>
+          <a:lstStyle/>
+          <a:p>
+            <a:pPr>
+              <a:defRPr/>
+            </a:pPr>
+            <a:fld id="{EE9AC89C-B0F3-4179-9BF1-A11BD48F530E}" type="datetime1">
+              <a:rPr lang="de-DE" smtClean="0"/>
+              <a:pPr>
+                <a:defRPr/>
+              </a:pPr>
+              <a:t>25.08.2017</a:t>
+            </a:fld>
+            <a:endParaRPr lang="de-DE" dirty="0"/>
+          </a:p>
+        </p:txBody>
+      </p:sp>
+      <p:sp>
+        <p:nvSpPr>
+          <p:cNvPr id="4" name="Fußzeilenplatzhalter 3"/>
+          <p:cNvSpPr>
+            <a:spLocks noGrp="1"/>
+          </p:cNvSpPr>
+          <p:nvPr>
+            <p:ph type="ftr" sz="quarter" idx="15"/>
+          </p:nvPr>
+        </p:nvSpPr>
+        <p:spPr/>
+        <p:txBody>
+          <a:bodyPr/>
+          <a:lstStyle/>
+          <a:p>
+            <a:pPr>
+              <a:defRPr/>
+            </a:pPr>
+            <a:endParaRPr lang="de-DE"/>
+          </a:p>
+        </p:txBody>
+      </p:sp>
+      <p:sp>
+        <p:nvSpPr>
+          <p:cNvPr id="5" name="Foliennummernplatzhalter 4"/>
+          <p:cNvSpPr>
+            <a:spLocks noGrp="1"/>
+          </p:cNvSpPr>
+          <p:nvPr>
+            <p:ph type="sldNum" sz="quarter" idx="16"/>
+          </p:nvPr>
+        </p:nvSpPr>
+        <p:spPr/>
+        <p:txBody>
+          <a:bodyPr/>
+          <a:lstStyle/>
+          <a:p>
+            <a:pPr>
+              <a:defRPr/>
+            </a:pPr>
+            <a:fld id="{B53A9DA1-A25A-429F-A02C-54EE5606360E}" type="slidenum">
+              <a:rPr lang="de-DE" altLang="de-DE" smtClean="0"/>
+              <a:pPr>
+                <a:defRPr/>
+              </a:pPr>
+              <a:t>41</a:t>
+            </a:fld>
+            <a:endParaRPr lang="de-DE" altLang="de-DE" dirty="0"/>
+          </a:p>
+        </p:txBody>
+      </p:sp>
+      <p:sp>
+        <p:nvSpPr>
+          <p:cNvPr id="6" name="Titel 5"/>
+          <p:cNvSpPr>
+            <a:spLocks noGrp="1"/>
+          </p:cNvSpPr>
+          <p:nvPr>
+            <p:ph type="title"/>
+          </p:nvPr>
+        </p:nvSpPr>
+        <p:spPr/>
+        <p:txBody>
+          <a:bodyPr/>
+          <a:lstStyle/>
+          <a:p>
+            <a:r>
+              <a:rPr lang="de-DE" dirty="0" smtClean="0"/>
+              <a:t>Benutzeroberfläche und Bedienung</a:t>
+            </a:r>
+            <a:endParaRPr lang="de-DE" dirty="0"/>
+          </a:p>
+        </p:txBody>
+      </p:sp>
+      <p:pic>
+        <p:nvPicPr>
+          <p:cNvPr id="53250" name="Picture 2" descr="C:\Users\kreme\Documents\SuchTool\Bilder\p.png"/>
+          <p:cNvPicPr>
+            <a:picLocks noGrp="1" noChangeAspect="1" noChangeArrowheads="1"/>
+          </p:cNvPicPr>
+          <p:nvPr>
+            <p:ph sz="quarter" idx="13"/>
+          </p:nvPr>
+        </p:nvPicPr>
+        <p:blipFill>
+          <a:blip r:embed="rId2" cstate="print"/>
+          <a:srcRect/>
+          <a:stretch>
+            <a:fillRect/>
+          </a:stretch>
+        </p:blipFill>
+        <p:spPr bwMode="auto">
+          <a:xfrm>
+            <a:off x="180000" y="1080000"/>
+            <a:ext cx="6755297" cy="5040312"/>
+          </a:xfrm>
+          <a:prstGeom prst="rect">
+            <a:avLst/>
+          </a:prstGeom>
+          <a:noFill/>
+        </p:spPr>
+      </p:pic>
+    </p:spTree>
+  </p:cSld>
+  <p:clrMapOvr>
+    <a:masterClrMapping/>
+  </p:clrMapOvr>
+</p:sld>
+</file>
+
+<file path=ppt/slides/slide42.xml><?xml version="1.0" encoding="utf-8"?>
+<p:sld xmlns:a="http://schemas.openxmlformats.org/drawingml/2006/main" xmlns:r="http://schemas.openxmlformats.org/officeDocument/2006/relationships" xmlns:p="http://schemas.openxmlformats.org/presentationml/2006/main">
+  <p:cSld>
+    <p:spTree>
+      <p:nvGrpSpPr>
+        <p:cNvPr id="1" name=""/>
+        <p:cNvGrpSpPr/>
+        <p:nvPr/>
+      </p:nvGrpSpPr>
+      <p:grpSpPr>
+        <a:xfrm>
+          <a:off x="0" y="0"/>
+          <a:ext cx="0" cy="0"/>
+          <a:chOff x="0" y="0"/>
+          <a:chExt cx="0" cy="0"/>
+        </a:xfrm>
+      </p:grpSpPr>
+      <p:sp>
+        <p:nvSpPr>
+          <p:cNvPr id="3" name="Datumsplatzhalter 2"/>
+          <p:cNvSpPr>
+            <a:spLocks noGrp="1"/>
+          </p:cNvSpPr>
+          <p:nvPr>
+            <p:ph type="dt" sz="half" idx="14"/>
+          </p:nvPr>
+        </p:nvSpPr>
+        <p:spPr/>
+        <p:txBody>
+          <a:bodyPr/>
+          <a:lstStyle/>
+          <a:p>
+            <a:pPr>
+              <a:defRPr/>
+            </a:pPr>
+            <a:fld id="{EE9AC89C-B0F3-4179-9BF1-A11BD48F530E}" type="datetime1">
+              <a:rPr lang="de-DE" smtClean="0"/>
+              <a:pPr>
+                <a:defRPr/>
+              </a:pPr>
+              <a:t>25.08.2017</a:t>
+            </a:fld>
+            <a:endParaRPr lang="de-DE" dirty="0"/>
+          </a:p>
+        </p:txBody>
+      </p:sp>
+      <p:sp>
+        <p:nvSpPr>
+          <p:cNvPr id="4" name="Fußzeilenplatzhalter 3"/>
+          <p:cNvSpPr>
+            <a:spLocks noGrp="1"/>
+          </p:cNvSpPr>
+          <p:nvPr>
+            <p:ph type="ftr" sz="quarter" idx="15"/>
+          </p:nvPr>
+        </p:nvSpPr>
+        <p:spPr/>
+        <p:txBody>
+          <a:bodyPr/>
+          <a:lstStyle/>
+          <a:p>
+            <a:pPr>
+              <a:defRPr/>
+            </a:pPr>
+            <a:endParaRPr lang="de-DE" dirty="0"/>
+          </a:p>
+        </p:txBody>
+      </p:sp>
+      <p:sp>
+        <p:nvSpPr>
+          <p:cNvPr id="5" name="Foliennummernplatzhalter 4"/>
+          <p:cNvSpPr>
+            <a:spLocks noGrp="1"/>
+          </p:cNvSpPr>
+          <p:nvPr>
+            <p:ph type="sldNum" sz="quarter" idx="16"/>
+          </p:nvPr>
+        </p:nvSpPr>
+        <p:spPr/>
+        <p:txBody>
+          <a:bodyPr/>
+          <a:lstStyle/>
+          <a:p>
+            <a:pPr>
+              <a:defRPr/>
+            </a:pPr>
+            <a:fld id="{B53A9DA1-A25A-429F-A02C-54EE5606360E}" type="slidenum">
+              <a:rPr lang="de-DE" altLang="de-DE" smtClean="0"/>
+              <a:pPr>
+                <a:defRPr/>
+              </a:pPr>
+              <a:t>42</a:t>
+            </a:fld>
+            <a:endParaRPr lang="de-DE" altLang="de-DE" dirty="0"/>
+          </a:p>
+        </p:txBody>
+      </p:sp>
+      <p:sp>
+        <p:nvSpPr>
+          <p:cNvPr id="6" name="Titel 5"/>
+          <p:cNvSpPr>
+            <a:spLocks noGrp="1"/>
+          </p:cNvSpPr>
+          <p:nvPr>
+            <p:ph type="title"/>
+          </p:nvPr>
+        </p:nvSpPr>
+        <p:spPr/>
+        <p:txBody>
+          <a:bodyPr/>
+          <a:lstStyle/>
+          <a:p>
+            <a:r>
+              <a:rPr lang="de-DE" dirty="0" smtClean="0"/>
+              <a:t>Benutzeroberfläche und Bedienung</a:t>
+            </a:r>
+            <a:endParaRPr lang="de-DE" dirty="0"/>
+          </a:p>
+        </p:txBody>
+      </p:sp>
+      <p:pic>
+        <p:nvPicPr>
+          <p:cNvPr id="54274" name="Picture 2" descr="C:\Users\kreme\Documents\SuchTool\Bilder\r.png"/>
+          <p:cNvPicPr>
+            <a:picLocks noGrp="1" noChangeAspect="1" noChangeArrowheads="1"/>
+          </p:cNvPicPr>
+          <p:nvPr>
+            <p:ph sz="quarter" idx="13"/>
+          </p:nvPr>
+        </p:nvPicPr>
+        <p:blipFill>
+          <a:blip r:embed="rId2" cstate="print"/>
+          <a:srcRect/>
+          <a:stretch>
+            <a:fillRect/>
+          </a:stretch>
+        </p:blipFill>
+        <p:spPr bwMode="auto">
+          <a:xfrm>
+            <a:off x="180000" y="2160000"/>
+            <a:ext cx="8640763" cy="1843363"/>
+          </a:xfrm>
+          <a:prstGeom prst="rect">
+            <a:avLst/>
+          </a:prstGeom>
+          <a:noFill/>
+        </p:spPr>
+      </p:pic>
+    </p:spTree>
+  </p:cSld>
+  <p:clrMapOvr>
+    <a:masterClrMapping/>
+  </p:clrMapOvr>
+</p:sld>
+</file>
+
+<file path=ppt/slides/slide43.xml><?xml version="1.0" encoding="utf-8"?>
+<p:sld xmlns:a="http://schemas.openxmlformats.org/drawingml/2006/main" xmlns:r="http://schemas.openxmlformats.org/officeDocument/2006/relationships" xmlns:p="http://schemas.openxmlformats.org/presentationml/2006/main">
+  <p:cSld>
+    <p:spTree>
+      <p:nvGrpSpPr>
+        <p:cNvPr id="1" name=""/>
+        <p:cNvGrpSpPr/>
+        <p:nvPr/>
+      </p:nvGrpSpPr>
+      <p:grpSpPr>
+        <a:xfrm>
+          <a:off x="0" y="0"/>
+          <a:ext cx="0" cy="0"/>
+          <a:chOff x="0" y="0"/>
+          <a:chExt cx="0" cy="0"/>
+        </a:xfrm>
+      </p:grpSpPr>
+      <p:sp>
+        <p:nvSpPr>
+          <p:cNvPr id="3" name="Datumsplatzhalter 2"/>
+          <p:cNvSpPr>
+            <a:spLocks noGrp="1"/>
+          </p:cNvSpPr>
+          <p:nvPr>
+            <p:ph type="dt" sz="half" idx="14"/>
+          </p:nvPr>
+        </p:nvSpPr>
+        <p:spPr/>
+        <p:txBody>
+          <a:bodyPr/>
+          <a:lstStyle/>
+          <a:p>
+            <a:pPr>
+              <a:defRPr/>
+            </a:pPr>
+            <a:fld id="{EE9AC89C-B0F3-4179-9BF1-A11BD48F530E}" type="datetime1">
+              <a:rPr lang="de-DE" smtClean="0"/>
+              <a:pPr>
+                <a:defRPr/>
+              </a:pPr>
+              <a:t>25.08.2017</a:t>
+            </a:fld>
+            <a:endParaRPr lang="de-DE" dirty="0"/>
+          </a:p>
+        </p:txBody>
+      </p:sp>
+      <p:sp>
+        <p:nvSpPr>
+          <p:cNvPr id="4" name="Fußzeilenplatzhalter 3"/>
+          <p:cNvSpPr>
+            <a:spLocks noGrp="1"/>
+          </p:cNvSpPr>
+          <p:nvPr>
+            <p:ph type="ftr" sz="quarter" idx="15"/>
+          </p:nvPr>
+        </p:nvSpPr>
+        <p:spPr/>
+        <p:txBody>
+          <a:bodyPr/>
+          <a:lstStyle/>
+          <a:p>
+            <a:pPr>
+              <a:defRPr/>
+            </a:pPr>
+            <a:endParaRPr lang="de-DE"/>
+          </a:p>
+        </p:txBody>
+      </p:sp>
+      <p:sp>
+        <p:nvSpPr>
+          <p:cNvPr id="5" name="Foliennummernplatzhalter 4"/>
+          <p:cNvSpPr>
+            <a:spLocks noGrp="1"/>
+          </p:cNvSpPr>
+          <p:nvPr>
+            <p:ph type="sldNum" sz="quarter" idx="16"/>
+          </p:nvPr>
+        </p:nvSpPr>
+        <p:spPr/>
+        <p:txBody>
+          <a:bodyPr/>
+          <a:lstStyle/>
+          <a:p>
+            <a:pPr>
+              <a:defRPr/>
+            </a:pPr>
+            <a:fld id="{B53A9DA1-A25A-429F-A02C-54EE5606360E}" type="slidenum">
+              <a:rPr lang="de-DE" altLang="de-DE" smtClean="0"/>
+              <a:pPr>
+                <a:defRPr/>
+              </a:pPr>
+              <a:t>43</a:t>
+            </a:fld>
+            <a:endParaRPr lang="de-DE" altLang="de-DE" dirty="0"/>
+          </a:p>
+        </p:txBody>
+      </p:sp>
+      <p:sp>
+        <p:nvSpPr>
+          <p:cNvPr id="6" name="Titel 5"/>
+          <p:cNvSpPr>
+            <a:spLocks noGrp="1"/>
+          </p:cNvSpPr>
+          <p:nvPr>
+            <p:ph type="title"/>
+          </p:nvPr>
+        </p:nvSpPr>
+        <p:spPr/>
+        <p:txBody>
+          <a:bodyPr/>
+          <a:lstStyle/>
+          <a:p>
+            <a:r>
+              <a:rPr lang="de-DE" dirty="0" smtClean="0"/>
+              <a:t>Benutzeroberfläche und Bedienung</a:t>
+            </a:r>
+            <a:endParaRPr lang="de-DE" dirty="0"/>
+          </a:p>
+        </p:txBody>
+      </p:sp>
+      <p:pic>
+        <p:nvPicPr>
+          <p:cNvPr id="55298" name="Picture 2" descr="C:\Users\kreme\Documents\SuchTool\Bilder\s.png"/>
+          <p:cNvPicPr>
+            <a:picLocks noGrp="1" noChangeAspect="1" noChangeArrowheads="1"/>
+          </p:cNvPicPr>
+          <p:nvPr>
+            <p:ph sz="quarter" idx="13"/>
+          </p:nvPr>
+        </p:nvPicPr>
+        <p:blipFill>
+          <a:blip r:embed="rId2" cstate="print"/>
+          <a:srcRect/>
+          <a:stretch>
+            <a:fillRect/>
+          </a:stretch>
+        </p:blipFill>
+        <p:spPr bwMode="auto">
+          <a:xfrm>
+            <a:off x="180000" y="2160000"/>
+            <a:ext cx="8640763" cy="1843363"/>
+          </a:xfrm>
+          <a:prstGeom prst="rect">
+            <a:avLst/>
+          </a:prstGeom>
+          <a:noFill/>
+        </p:spPr>
+      </p:pic>
+    </p:spTree>
+  </p:cSld>
+  <p:clrMapOvr>
+    <a:masterClrMapping/>
+  </p:clrMapOvr>
+</p:sld>
+</file>
+
+<file path=ppt/slides/slide44.xml><?xml version="1.0" encoding="utf-8"?>
+<p:sld xmlns:a="http://schemas.openxmlformats.org/drawingml/2006/main" xmlns:r="http://schemas.openxmlformats.org/officeDocument/2006/relationships" xmlns:p="http://schemas.openxmlformats.org/presentationml/2006/main">
+  <p:cSld>
+    <p:spTree>
+      <p:nvGrpSpPr>
+        <p:cNvPr id="1" name=""/>
+        <p:cNvGrpSpPr/>
+        <p:nvPr/>
+      </p:nvGrpSpPr>
+      <p:grpSpPr>
+        <a:xfrm>
+          <a:off x="0" y="0"/>
+          <a:ext cx="0" cy="0"/>
+          <a:chOff x="0" y="0"/>
+          <a:chExt cx="0" cy="0"/>
+        </a:xfrm>
+      </p:grpSpPr>
+      <p:sp>
+        <p:nvSpPr>
+          <p:cNvPr id="3" name="Datumsplatzhalter 2"/>
+          <p:cNvSpPr>
+            <a:spLocks noGrp="1"/>
+          </p:cNvSpPr>
+          <p:nvPr>
+            <p:ph type="dt" sz="half" idx="14"/>
+          </p:nvPr>
+        </p:nvSpPr>
+        <p:spPr/>
+        <p:txBody>
+          <a:bodyPr/>
+          <a:lstStyle/>
+          <a:p>
+            <a:pPr>
+              <a:defRPr/>
+            </a:pPr>
+            <a:fld id="{EE9AC89C-B0F3-4179-9BF1-A11BD48F530E}" type="datetime1">
+              <a:rPr lang="de-DE" smtClean="0"/>
+              <a:pPr>
+                <a:defRPr/>
+              </a:pPr>
+              <a:t>25.08.2017</a:t>
+            </a:fld>
+            <a:endParaRPr lang="de-DE" dirty="0"/>
+          </a:p>
+        </p:txBody>
+      </p:sp>
+      <p:sp>
+        <p:nvSpPr>
+          <p:cNvPr id="4" name="Fußzeilenplatzhalter 3"/>
+          <p:cNvSpPr>
+            <a:spLocks noGrp="1"/>
+          </p:cNvSpPr>
+          <p:nvPr>
+            <p:ph type="ftr" sz="quarter" idx="15"/>
+          </p:nvPr>
+        </p:nvSpPr>
+        <p:spPr/>
+        <p:txBody>
+          <a:bodyPr/>
+          <a:lstStyle/>
+          <a:p>
+            <a:pPr>
+              <a:defRPr/>
+            </a:pPr>
+            <a:endParaRPr lang="de-DE"/>
+          </a:p>
+        </p:txBody>
+      </p:sp>
+      <p:sp>
+        <p:nvSpPr>
+          <p:cNvPr id="5" name="Foliennummernplatzhalter 4"/>
+          <p:cNvSpPr>
+            <a:spLocks noGrp="1"/>
+          </p:cNvSpPr>
+          <p:nvPr>
+            <p:ph type="sldNum" sz="quarter" idx="16"/>
+          </p:nvPr>
+        </p:nvSpPr>
+        <p:spPr/>
+        <p:txBody>
+          <a:bodyPr/>
+          <a:lstStyle/>
+          <a:p>
+            <a:pPr>
+              <a:defRPr/>
+            </a:pPr>
+            <a:fld id="{B53A9DA1-A25A-429F-A02C-54EE5606360E}" type="slidenum">
+              <a:rPr lang="de-DE" altLang="de-DE" smtClean="0"/>
+              <a:pPr>
+                <a:defRPr/>
+              </a:pPr>
+              <a:t>44</a:t>
+            </a:fld>
+            <a:endParaRPr lang="de-DE" altLang="de-DE" dirty="0"/>
+          </a:p>
+        </p:txBody>
+      </p:sp>
+      <p:sp>
+        <p:nvSpPr>
+          <p:cNvPr id="6" name="Titel 5"/>
+          <p:cNvSpPr>
+            <a:spLocks noGrp="1"/>
+          </p:cNvSpPr>
+          <p:nvPr>
+            <p:ph type="title"/>
+          </p:nvPr>
+        </p:nvSpPr>
+        <p:spPr/>
+        <p:txBody>
+          <a:bodyPr/>
+          <a:lstStyle/>
+          <a:p>
+            <a:r>
+              <a:rPr lang="de-DE" dirty="0" smtClean="0"/>
+              <a:t>Benutzeroberfläche und Bedienung</a:t>
+            </a:r>
+            <a:endParaRPr lang="de-DE" dirty="0"/>
+          </a:p>
+        </p:txBody>
+      </p:sp>
+      <p:pic>
+        <p:nvPicPr>
+          <p:cNvPr id="56322" name="Picture 2" descr="C:\Users\kreme\Documents\SuchTool\Bilder\t.png"/>
+          <p:cNvPicPr>
+            <a:picLocks noGrp="1" noChangeAspect="1" noChangeArrowheads="1"/>
+          </p:cNvPicPr>
+          <p:nvPr>
+            <p:ph sz="quarter" idx="13"/>
+          </p:nvPr>
+        </p:nvPicPr>
+        <p:blipFill>
+          <a:blip r:embed="rId2" cstate="print"/>
+          <a:srcRect/>
+          <a:stretch>
+            <a:fillRect/>
+          </a:stretch>
+        </p:blipFill>
+        <p:spPr bwMode="auto">
+          <a:xfrm>
+            <a:off x="180000" y="2160000"/>
+            <a:ext cx="8640763" cy="2344859"/>
+          </a:xfrm>
+          <a:prstGeom prst="rect">
+            <a:avLst/>
+          </a:prstGeom>
+          <a:noFill/>
+        </p:spPr>
+      </p:pic>
+    </p:spTree>
+  </p:cSld>
+  <p:clrMapOvr>
+    <a:masterClrMapping/>
+  </p:clrMapOvr>
+</p:sld>
+</file>
+
+<file path=ppt/slides/slide45.xml><?xml version="1.0" encoding="utf-8"?>
+<p:sld xmlns:a="http://schemas.openxmlformats.org/drawingml/2006/main" xmlns:r="http://schemas.openxmlformats.org/officeDocument/2006/relationships" xmlns:p="http://schemas.openxmlformats.org/presentationml/2006/main">
+  <p:cSld>
+    <p:spTree>
+      <p:nvGrpSpPr>
+        <p:cNvPr id="1" name=""/>
+        <p:cNvGrpSpPr/>
+        <p:nvPr/>
+      </p:nvGrpSpPr>
+      <p:grpSpPr>
+        <a:xfrm>
+          <a:off x="0" y="0"/>
+          <a:ext cx="0" cy="0"/>
+          <a:chOff x="0" y="0"/>
+          <a:chExt cx="0" cy="0"/>
+        </a:xfrm>
+      </p:grpSpPr>
+      <p:sp>
+        <p:nvSpPr>
+          <p:cNvPr id="3" name="Datumsplatzhalter 2"/>
+          <p:cNvSpPr>
+            <a:spLocks noGrp="1"/>
+          </p:cNvSpPr>
+          <p:nvPr>
+            <p:ph type="dt" sz="half" idx="14"/>
+          </p:nvPr>
+        </p:nvSpPr>
+        <p:spPr/>
+        <p:txBody>
+          <a:bodyPr/>
+          <a:lstStyle/>
+          <a:p>
+            <a:pPr>
+              <a:defRPr/>
+            </a:pPr>
+            <a:fld id="{EE9AC89C-B0F3-4179-9BF1-A11BD48F530E}" type="datetime1">
+              <a:rPr lang="de-DE" smtClean="0"/>
+              <a:pPr>
+                <a:defRPr/>
+              </a:pPr>
+              <a:t>25.08.2017</a:t>
+            </a:fld>
+            <a:endParaRPr lang="de-DE" dirty="0"/>
+          </a:p>
+        </p:txBody>
+      </p:sp>
+      <p:sp>
+        <p:nvSpPr>
+          <p:cNvPr id="4" name="Fußzeilenplatzhalter 3"/>
+          <p:cNvSpPr>
+            <a:spLocks noGrp="1"/>
+          </p:cNvSpPr>
+          <p:nvPr>
+            <p:ph type="ftr" sz="quarter" idx="15"/>
+          </p:nvPr>
+        </p:nvSpPr>
+        <p:spPr/>
+        <p:txBody>
+          <a:bodyPr/>
+          <a:lstStyle/>
+          <a:p>
+            <a:pPr>
+              <a:defRPr/>
+            </a:pPr>
+            <a:endParaRPr lang="de-DE"/>
+          </a:p>
+        </p:txBody>
+      </p:sp>
+      <p:sp>
+        <p:nvSpPr>
+          <p:cNvPr id="5" name="Foliennummernplatzhalter 4"/>
+          <p:cNvSpPr>
+            <a:spLocks noGrp="1"/>
+          </p:cNvSpPr>
+          <p:nvPr>
+            <p:ph type="sldNum" sz="quarter" idx="16"/>
+          </p:nvPr>
+        </p:nvSpPr>
+        <p:spPr/>
+        <p:txBody>
+          <a:bodyPr/>
+          <a:lstStyle/>
+          <a:p>
+            <a:pPr>
+              <a:defRPr/>
+            </a:pPr>
+            <a:fld id="{B53A9DA1-A25A-429F-A02C-54EE5606360E}" type="slidenum">
+              <a:rPr lang="de-DE" altLang="de-DE" smtClean="0"/>
+              <a:pPr>
+                <a:defRPr/>
+              </a:pPr>
+              <a:t>45</a:t>
+            </a:fld>
+            <a:endParaRPr lang="de-DE" altLang="de-DE" dirty="0"/>
+          </a:p>
+        </p:txBody>
+      </p:sp>
+      <p:sp>
+        <p:nvSpPr>
+          <p:cNvPr id="6" name="Titel 5"/>
+          <p:cNvSpPr>
+            <a:spLocks noGrp="1"/>
+          </p:cNvSpPr>
+          <p:nvPr>
+            <p:ph type="title"/>
+          </p:nvPr>
+        </p:nvSpPr>
+        <p:spPr/>
+        <p:txBody>
+          <a:bodyPr/>
+          <a:lstStyle/>
+          <a:p>
+            <a:r>
+              <a:rPr lang="de-DE" dirty="0" smtClean="0"/>
+              <a:t>Benutzeroberfläche und Bedienung</a:t>
+            </a:r>
+            <a:endParaRPr lang="de-DE" dirty="0"/>
+          </a:p>
+        </p:txBody>
+      </p:sp>
+      <p:pic>
+        <p:nvPicPr>
+          <p:cNvPr id="57346" name="Picture 2" descr="C:\Users\kreme\Documents\SuchTool\Bilder\u.png"/>
+          <p:cNvPicPr>
+            <a:picLocks noGrp="1" noChangeAspect="1" noChangeArrowheads="1"/>
+          </p:cNvPicPr>
+          <p:nvPr>
+            <p:ph sz="quarter" idx="13"/>
+          </p:nvPr>
+        </p:nvPicPr>
+        <p:blipFill>
+          <a:blip r:embed="rId2" cstate="print"/>
+          <a:srcRect/>
+          <a:stretch>
+            <a:fillRect/>
+          </a:stretch>
+        </p:blipFill>
+        <p:spPr bwMode="auto">
+          <a:xfrm>
+            <a:off x="180000" y="2160000"/>
+            <a:ext cx="8640763" cy="2344859"/>
+          </a:xfrm>
+          <a:prstGeom prst="rect">
+            <a:avLst/>
+          </a:prstGeom>
+          <a:noFill/>
+        </p:spPr>
+      </p:pic>
+    </p:spTree>
+  </p:cSld>
+  <p:clrMapOvr>
+    <a:masterClrMapping/>
+  </p:clrMapOvr>
+</p:sld>
+</file>
+
+<file path=ppt/slides/slide46.xml><?xml version="1.0" encoding="utf-8"?>
+<p:sld xmlns:a="http://schemas.openxmlformats.org/drawingml/2006/main" xmlns:r="http://schemas.openxmlformats.org/officeDocument/2006/relationships" xmlns:p="http://schemas.openxmlformats.org/presentationml/2006/main">
+  <p:cSld>
+    <p:spTree>
+      <p:nvGrpSpPr>
+        <p:cNvPr id="1" name=""/>
+        <p:cNvGrpSpPr/>
+        <p:nvPr/>
+      </p:nvGrpSpPr>
+      <p:grpSpPr>
+        <a:xfrm>
+          <a:off x="0" y="0"/>
+          <a:ext cx="0" cy="0"/>
+          <a:chOff x="0" y="0"/>
+          <a:chExt cx="0" cy="0"/>
+        </a:xfrm>
+      </p:grpSpPr>
+      <p:sp>
+        <p:nvSpPr>
+          <p:cNvPr id="3" name="Datumsplatzhalter 2"/>
+          <p:cNvSpPr>
+            <a:spLocks noGrp="1"/>
+          </p:cNvSpPr>
+          <p:nvPr>
+            <p:ph type="dt" sz="half" idx="14"/>
+          </p:nvPr>
+        </p:nvSpPr>
+        <p:spPr/>
+        <p:txBody>
+          <a:bodyPr/>
+          <a:lstStyle/>
+          <a:p>
+            <a:pPr>
+              <a:defRPr/>
+            </a:pPr>
+            <a:fld id="{EE9AC89C-B0F3-4179-9BF1-A11BD48F530E}" type="datetime1">
+              <a:rPr lang="de-DE" smtClean="0"/>
+              <a:pPr>
+                <a:defRPr/>
+              </a:pPr>
+              <a:t>25.08.2017</a:t>
+            </a:fld>
+            <a:endParaRPr lang="de-DE" dirty="0"/>
+          </a:p>
+        </p:txBody>
+      </p:sp>
+      <p:sp>
+        <p:nvSpPr>
+          <p:cNvPr id="4" name="Fußzeilenplatzhalter 3"/>
+          <p:cNvSpPr>
+            <a:spLocks noGrp="1"/>
+          </p:cNvSpPr>
+          <p:nvPr>
+            <p:ph type="ftr" sz="quarter" idx="15"/>
+          </p:nvPr>
+        </p:nvSpPr>
+        <p:spPr/>
+        <p:txBody>
+          <a:bodyPr/>
+          <a:lstStyle/>
+          <a:p>
+            <a:pPr>
+              <a:defRPr/>
+            </a:pPr>
+            <a:endParaRPr lang="de-DE"/>
+          </a:p>
+        </p:txBody>
+      </p:sp>
+      <p:sp>
+        <p:nvSpPr>
+          <p:cNvPr id="5" name="Foliennummernplatzhalter 4"/>
+          <p:cNvSpPr>
+            <a:spLocks noGrp="1"/>
+          </p:cNvSpPr>
+          <p:nvPr>
+            <p:ph type="sldNum" sz="quarter" idx="16"/>
+          </p:nvPr>
+        </p:nvSpPr>
+        <p:spPr/>
+        <p:txBody>
+          <a:bodyPr/>
+          <a:lstStyle/>
+          <a:p>
+            <a:pPr>
+              <a:defRPr/>
+            </a:pPr>
+            <a:fld id="{B53A9DA1-A25A-429F-A02C-54EE5606360E}" type="slidenum">
+              <a:rPr lang="de-DE" altLang="de-DE" smtClean="0"/>
+              <a:pPr>
+                <a:defRPr/>
+              </a:pPr>
+              <a:t>46</a:t>
+            </a:fld>
+            <a:endParaRPr lang="de-DE" altLang="de-DE" dirty="0"/>
+          </a:p>
+        </p:txBody>
+      </p:sp>
+      <p:sp>
+        <p:nvSpPr>
+          <p:cNvPr id="6" name="Titel 5"/>
+          <p:cNvSpPr>
+            <a:spLocks noGrp="1"/>
+          </p:cNvSpPr>
+          <p:nvPr>
+            <p:ph type="title"/>
+          </p:nvPr>
+        </p:nvSpPr>
+        <p:spPr/>
+        <p:txBody>
+          <a:bodyPr/>
+          <a:lstStyle/>
+          <a:p>
+            <a:r>
+              <a:rPr lang="de-DE" dirty="0" smtClean="0"/>
+              <a:t>Benutzeroberfläche und Bedienung</a:t>
+            </a:r>
+            <a:endParaRPr lang="de-DE" dirty="0"/>
+          </a:p>
+        </p:txBody>
+      </p:sp>
+      <p:pic>
+        <p:nvPicPr>
+          <p:cNvPr id="58370" name="Picture 2" descr="C:\Users\kreme\Documents\SuchTool\Bilder\v.png"/>
+          <p:cNvPicPr>
+            <a:picLocks noGrp="1" noChangeAspect="1" noChangeArrowheads="1"/>
+          </p:cNvPicPr>
+          <p:nvPr>
+            <p:ph sz="quarter" idx="13"/>
+          </p:nvPr>
+        </p:nvPicPr>
+        <p:blipFill>
+          <a:blip r:embed="rId2" cstate="print"/>
+          <a:srcRect/>
+          <a:stretch>
+            <a:fillRect/>
+          </a:stretch>
+        </p:blipFill>
+        <p:spPr bwMode="auto">
+          <a:xfrm>
+            <a:off x="755576" y="2420888"/>
+            <a:ext cx="7135221" cy="1905266"/>
+          </a:xfrm>
+          <a:prstGeom prst="rect">
+            <a:avLst/>
+          </a:prstGeom>
+          <a:noFill/>
+        </p:spPr>
+      </p:pic>
+    </p:spTree>
+  </p:cSld>
+  <p:clrMapOvr>
+    <a:masterClrMapping/>
+  </p:clrMapOvr>
+</p:sld>
+</file>
+
+<file path=ppt/slides/slide47.xml><?xml version="1.0" encoding="utf-8"?>
+<p:sld xmlns:a="http://schemas.openxmlformats.org/drawingml/2006/main" xmlns:r="http://schemas.openxmlformats.org/officeDocument/2006/relationships" xmlns:p="http://schemas.openxmlformats.org/presentationml/2006/main">
+  <p:cSld>
+    <p:spTree>
+      <p:nvGrpSpPr>
+        <p:cNvPr id="1" name=""/>
+        <p:cNvGrpSpPr/>
+        <p:nvPr/>
+      </p:nvGrpSpPr>
+      <p:grpSpPr>
+        <a:xfrm>
+          <a:off x="0" y="0"/>
+          <a:ext cx="0" cy="0"/>
+          <a:chOff x="0" y="0"/>
+          <a:chExt cx="0" cy="0"/>
+        </a:xfrm>
+      </p:grpSpPr>
+      <p:sp>
+        <p:nvSpPr>
+          <p:cNvPr id="2" name="Inhaltsplatzhalter 1"/>
+          <p:cNvSpPr>
+            <a:spLocks noGrp="1"/>
+          </p:cNvSpPr>
+          <p:nvPr>
+            <p:ph sz="quarter" idx="13"/>
+          </p:nvPr>
+        </p:nvSpPr>
+        <p:spPr/>
+        <p:txBody>
+          <a:bodyPr/>
+          <a:lstStyle/>
+          <a:p>
+            <a:endParaRPr lang="de-DE" dirty="0" smtClean="0"/>
+          </a:p>
+          <a:p>
+            <a:pPr>
+              <a:buFont typeface="Arial" pitchFamily="34" charset="0"/>
+              <a:buChar char="•"/>
+            </a:pPr>
+            <a:r>
+              <a:rPr lang="de-DE" dirty="0" smtClean="0"/>
+              <a:t> Noch Fragen?</a:t>
+            </a:r>
+            <a:endParaRPr lang="de-DE" dirty="0"/>
+          </a:p>
+        </p:txBody>
+      </p:sp>
+      <p:sp>
+        <p:nvSpPr>
+          <p:cNvPr id="3" name="Datumsplatzhalter 2"/>
+          <p:cNvSpPr>
+            <a:spLocks noGrp="1"/>
+          </p:cNvSpPr>
+          <p:nvPr>
+            <p:ph type="dt" sz="half" idx="14"/>
+          </p:nvPr>
+        </p:nvSpPr>
+        <p:spPr/>
+        <p:txBody>
+          <a:bodyPr/>
+          <a:lstStyle/>
+          <a:p>
+            <a:pPr>
+              <a:defRPr/>
+            </a:pPr>
+            <a:fld id="{EE9AC89C-B0F3-4179-9BF1-A11BD48F530E}" type="datetime1">
+              <a:rPr lang="de-DE" smtClean="0"/>
+              <a:pPr>
+                <a:defRPr/>
+              </a:pPr>
+              <a:t>25.08.2017</a:t>
+            </a:fld>
+            <a:endParaRPr lang="de-DE" dirty="0"/>
+          </a:p>
+        </p:txBody>
+      </p:sp>
+      <p:sp>
+        <p:nvSpPr>
+          <p:cNvPr id="4" name="Fußzeilenplatzhalter 3"/>
+          <p:cNvSpPr>
+            <a:spLocks noGrp="1"/>
+          </p:cNvSpPr>
+          <p:nvPr>
+            <p:ph type="ftr" sz="quarter" idx="15"/>
+          </p:nvPr>
+        </p:nvSpPr>
+        <p:spPr/>
+        <p:txBody>
+          <a:bodyPr/>
+          <a:lstStyle/>
+          <a:p>
+            <a:pPr>
+              <a:defRPr/>
+            </a:pPr>
+            <a:endParaRPr lang="de-DE"/>
+          </a:p>
+        </p:txBody>
+      </p:sp>
+      <p:sp>
+        <p:nvSpPr>
+          <p:cNvPr id="5" name="Foliennummernplatzhalter 4"/>
+          <p:cNvSpPr>
+            <a:spLocks noGrp="1"/>
+          </p:cNvSpPr>
+          <p:nvPr>
+            <p:ph type="sldNum" sz="quarter" idx="16"/>
+          </p:nvPr>
+        </p:nvSpPr>
+        <p:spPr/>
+        <p:txBody>
+          <a:bodyPr/>
+          <a:lstStyle/>
+          <a:p>
+            <a:pPr>
+              <a:defRPr/>
+            </a:pPr>
+            <a:fld id="{B53A9DA1-A25A-429F-A02C-54EE5606360E}" type="slidenum">
+              <a:rPr lang="de-DE" altLang="de-DE" smtClean="0"/>
+              <a:pPr>
+                <a:defRPr/>
+              </a:pPr>
+              <a:t>47</a:t>
+            </a:fld>
+            <a:endParaRPr lang="de-DE" altLang="de-DE" dirty="0"/>
+          </a:p>
+        </p:txBody>
+      </p:sp>
+      <p:sp>
+        <p:nvSpPr>
+          <p:cNvPr id="6" name="Titel 5"/>
+          <p:cNvSpPr>
+            <a:spLocks noGrp="1"/>
+          </p:cNvSpPr>
+          <p:nvPr>
+            <p:ph type="title"/>
+          </p:nvPr>
+        </p:nvSpPr>
+        <p:spPr/>
+        <p:txBody>
+          <a:bodyPr/>
+          <a:lstStyle/>
+          <a:p>
+            <a:r>
+              <a:rPr lang="de-DE" dirty="0" smtClean="0"/>
+              <a:t>Ende</a:t>
+            </a:r>
+            <a:endParaRPr lang="de-DE" dirty="0"/>
+          </a:p>
+        </p:txBody>
+      </p:sp>
+      <p:pic>
+        <p:nvPicPr>
+          <p:cNvPr id="59400" name="Picture 8" descr="Bildergebnis für fragezeichen"/>
+          <p:cNvPicPr>
+            <a:picLocks noChangeAspect="1" noChangeArrowheads="1"/>
+          </p:cNvPicPr>
+          <p:nvPr/>
+        </p:nvPicPr>
+        <p:blipFill>
+          <a:blip r:embed="rId2" cstate="print"/>
+          <a:srcRect/>
+          <a:stretch>
+            <a:fillRect/>
+          </a:stretch>
+        </p:blipFill>
+        <p:spPr bwMode="auto">
+          <a:xfrm>
+            <a:off x="3203848" y="2060848"/>
+            <a:ext cx="3370362" cy="3370362"/>
+          </a:xfrm>
+          <a:prstGeom prst="rect">
+            <a:avLst/>
+          </a:prstGeom>
+          <a:noFill/>
+        </p:spPr>
+      </p:pic>
+    </p:spTree>
+  </p:cSld>
+  <p:clrMapOvr>
+    <a:masterClrMapping/>
+  </p:clrMapOvr>
+</p:sld>
+</file>
+
+<file path=ppt/slides/slide48.xml><?xml version="1.0" encoding="utf-8"?>
+<p:sld xmlns:a="http://schemas.openxmlformats.org/drawingml/2006/main" xmlns:r="http://schemas.openxmlformats.org/officeDocument/2006/relationships" xmlns:p="http://schemas.openxmlformats.org/presentationml/2006/main">
+  <p:cSld>
+    <p:spTree>
+      <p:nvGrpSpPr>
+        <p:cNvPr id="1" name=""/>
+        <p:cNvGrpSpPr/>
+        <p:nvPr/>
+      </p:nvGrpSpPr>
+      <p:grpSpPr>
+        <a:xfrm>
+          <a:off x="0" y="0"/>
+          <a:ext cx="0" cy="0"/>
+          <a:chOff x="0" y="0"/>
+          <a:chExt cx="0" cy="0"/>
+        </a:xfrm>
+      </p:grpSpPr>
+      <p:sp>
+        <p:nvSpPr>
+          <p:cNvPr id="2" name="Inhaltsplatzhalter 1"/>
+          <p:cNvSpPr>
+            <a:spLocks noGrp="1"/>
+          </p:cNvSpPr>
+          <p:nvPr>
+            <p:ph sz="quarter" idx="13"/>
+          </p:nvPr>
+        </p:nvSpPr>
+        <p:spPr/>
+        <p:txBody>
+          <a:bodyPr/>
+          <a:lstStyle/>
+          <a:p>
+            <a:pPr>
+              <a:buFont typeface="Arial" pitchFamily="34" charset="0"/>
+              <a:buChar char="•"/>
+            </a:pPr>
+            <a:r>
+              <a:rPr lang="de-DE" dirty="0" smtClean="0">
+                <a:hlinkClick r:id="rId2"/>
+              </a:rPr>
+              <a:t>https</a:t>
+            </a:r>
+            <a:r>
+              <a:rPr lang="de-DE" dirty="0" smtClean="0">
+                <a:hlinkClick r:id="rId2"/>
+              </a:rPr>
+              <a:t>://de.wikipedia.org/wiki/Google</a:t>
+            </a:r>
+            <a:endParaRPr lang="de-DE" dirty="0" smtClean="0"/>
+          </a:p>
+          <a:p>
+            <a:pPr>
+              <a:buFont typeface="Arial" pitchFamily="34" charset="0"/>
+              <a:buChar char="•"/>
+            </a:pPr>
+            <a:r>
+              <a:rPr lang="de-DE" dirty="0" smtClean="0">
+                <a:hlinkClick r:id="rId3"/>
+              </a:rPr>
+              <a:t>http</a:t>
+            </a:r>
+            <a:r>
+              <a:rPr lang="de-DE" dirty="0" smtClean="0">
+                <a:hlinkClick r:id="rId3"/>
+              </a:rPr>
+              <a:t>://www.underconsideration.com/brandnew/archives/new_logo_for_bing.php</a:t>
+            </a:r>
+            <a:endParaRPr lang="de-DE" dirty="0" smtClean="0"/>
+          </a:p>
+          <a:p>
+            <a:pPr>
+              <a:buFont typeface="Arial" pitchFamily="34" charset="0"/>
+              <a:buChar char="•"/>
+            </a:pPr>
+            <a:r>
+              <a:rPr lang="de-DE" dirty="0" smtClean="0">
+                <a:hlinkClick r:id="rId4"/>
+              </a:rPr>
+              <a:t>http://bibserv.fh-trier.de:8080/webOPACClient/search.do?methodToCall=start</a:t>
+            </a:r>
+            <a:endParaRPr lang="de-DE" dirty="0" smtClean="0"/>
+          </a:p>
+          <a:p>
+            <a:pPr>
+              <a:buFont typeface="Arial" pitchFamily="34" charset="0"/>
+              <a:buChar char="•"/>
+            </a:pPr>
+            <a:r>
+              <a:rPr lang="de-DE" dirty="0" smtClean="0">
+                <a:hlinkClick r:id="rId5"/>
+              </a:rPr>
+              <a:t>http://</a:t>
+            </a:r>
+            <a:r>
+              <a:rPr lang="de-DE" dirty="0" smtClean="0">
+                <a:hlinkClick r:id="rId5"/>
+              </a:rPr>
+              <a:t>www.arbeitstipps.de/email-postfach-aufraeumen-3-tipps.html</a:t>
+            </a:r>
+            <a:endParaRPr lang="de-DE" dirty="0" smtClean="0"/>
+          </a:p>
+          <a:p>
+            <a:pPr>
+              <a:buFont typeface="Arial" pitchFamily="34" charset="0"/>
+              <a:buChar char="•"/>
+            </a:pPr>
+            <a:r>
+              <a:rPr lang="de-DE" dirty="0" smtClean="0">
+                <a:hlinkClick r:id="rId6"/>
+              </a:rPr>
+              <a:t>http://</a:t>
+            </a:r>
+            <a:r>
+              <a:rPr lang="de-DE" dirty="0" smtClean="0">
+                <a:hlinkClick r:id="rId6"/>
+              </a:rPr>
+              <a:t>de.freepik.com/freie-ikonen/fragezeichen_731610.htm</a:t>
+            </a:r>
+            <a:r>
+              <a:rPr lang="de-DE" dirty="0" smtClean="0"/>
+              <a:t> </a:t>
+            </a:r>
+            <a:endParaRPr lang="de-DE" dirty="0"/>
+          </a:p>
+        </p:txBody>
+      </p:sp>
+      <p:sp>
+        <p:nvSpPr>
+          <p:cNvPr id="3" name="Datumsplatzhalter 2"/>
+          <p:cNvSpPr>
+            <a:spLocks noGrp="1"/>
+          </p:cNvSpPr>
+          <p:nvPr>
+            <p:ph type="dt" sz="half" idx="14"/>
+          </p:nvPr>
+        </p:nvSpPr>
+        <p:spPr/>
+        <p:txBody>
+          <a:bodyPr/>
+          <a:lstStyle/>
+          <a:p>
+            <a:pPr>
+              <a:defRPr/>
+            </a:pPr>
+            <a:fld id="{EE9AC89C-B0F3-4179-9BF1-A11BD48F530E}" type="datetime1">
+              <a:rPr lang="de-DE" smtClean="0"/>
+              <a:pPr>
+                <a:defRPr/>
+              </a:pPr>
+              <a:t>25.08.2017</a:t>
+            </a:fld>
+            <a:endParaRPr lang="de-DE" dirty="0"/>
+          </a:p>
+        </p:txBody>
+      </p:sp>
+      <p:sp>
+        <p:nvSpPr>
+          <p:cNvPr id="4" name="Fußzeilenplatzhalter 3"/>
+          <p:cNvSpPr>
+            <a:spLocks noGrp="1"/>
+          </p:cNvSpPr>
+          <p:nvPr>
+            <p:ph type="ftr" sz="quarter" idx="15"/>
+          </p:nvPr>
+        </p:nvSpPr>
+        <p:spPr/>
+        <p:txBody>
+          <a:bodyPr/>
+          <a:lstStyle/>
+          <a:p>
+            <a:pPr>
+              <a:defRPr/>
+            </a:pPr>
+            <a:endParaRPr lang="de-DE"/>
+          </a:p>
+        </p:txBody>
+      </p:sp>
+      <p:sp>
+        <p:nvSpPr>
+          <p:cNvPr id="5" name="Foliennummernplatzhalter 4"/>
+          <p:cNvSpPr>
+            <a:spLocks noGrp="1"/>
+          </p:cNvSpPr>
+          <p:nvPr>
+            <p:ph type="sldNum" sz="quarter" idx="16"/>
+          </p:nvPr>
+        </p:nvSpPr>
+        <p:spPr/>
+        <p:txBody>
+          <a:bodyPr/>
+          <a:lstStyle/>
+          <a:p>
+            <a:pPr>
+              <a:defRPr/>
+            </a:pPr>
+            <a:fld id="{B53A9DA1-A25A-429F-A02C-54EE5606360E}" type="slidenum">
+              <a:rPr lang="de-DE" altLang="de-DE" smtClean="0"/>
+              <a:pPr>
+                <a:defRPr/>
+              </a:pPr>
+              <a:t>48</a:t>
+            </a:fld>
+            <a:endParaRPr lang="de-DE" altLang="de-DE" dirty="0"/>
+          </a:p>
+        </p:txBody>
+      </p:sp>
+      <p:sp>
+        <p:nvSpPr>
+          <p:cNvPr id="6" name="Titel 5"/>
+          <p:cNvSpPr>
+            <a:spLocks noGrp="1"/>
+          </p:cNvSpPr>
+          <p:nvPr>
+            <p:ph type="title"/>
+          </p:nvPr>
+        </p:nvSpPr>
+        <p:spPr/>
+        <p:txBody>
+          <a:bodyPr/>
+          <a:lstStyle/>
+          <a:p>
+            <a:r>
+              <a:rPr lang="de-DE" dirty="0" smtClean="0"/>
+              <a:t>Bildquellen</a:t>
+            </a:r>
+            <a:endParaRPr lang="de-DE" dirty="0"/>
+          </a:p>
+        </p:txBody>
+      </p:sp>
+    </p:spTree>
+  </p:cSld>
+  <p:clrMapOvr>
+    <a:masterClrMapping/>
+  </p:clrMapOvr>
+  <p:timing>
+    <p:tnLst>
+      <p:par>
+        <p:cTn id="1" dur="indefinite" restart="never" nodeType="tmRoot"/>
+      </p:par>
+    </p:tnLst>
+  </p:timing>
+</p:sld>
+</file>
+
 <file path=ppt/slides/slide5.xml><?xml version="1.0" encoding="utf-8"?>
 <p:sld xmlns:a="http://schemas.openxmlformats.org/drawingml/2006/main" xmlns:r="http://schemas.openxmlformats.org/officeDocument/2006/relationships" xmlns:p="http://schemas.openxmlformats.org/presentationml/2006/main">
   <p:cSld>
@@ -11472,7 +13994,7 @@
               <a:pPr>
                 <a:defRPr/>
               </a:pPr>
-              <a:t>17.08.2017</a:t>
+              <a:t>25.08.2017</a:t>
             </a:fld>
             <a:endParaRPr lang="de-DE" dirty="0"/>
           </a:p>
@@ -11692,7 +14214,7 @@
               <a:pPr>
                 <a:defRPr/>
               </a:pPr>
-              <a:t>17.08.2017</a:t>
+              <a:t>25.08.2017</a:t>
             </a:fld>
             <a:endParaRPr lang="de-DE" dirty="0"/>
           </a:p>
@@ -11955,7 +14477,7 @@
               <a:pPr>
                 <a:defRPr/>
               </a:pPr>
-              <a:t>17.08.2017</a:t>
+              <a:t>25.08.2017</a:t>
             </a:fld>
             <a:endParaRPr lang="de-DE" dirty="0"/>
           </a:p>

</xml_diff>